<commit_message>
Storyboard in PP hinzugefügt
</commit_message>
<xml_diff>
--- a/doc/task03/Task3.pptx
+++ b/doc/task03/Task3.pptx
@@ -113,7 +113,7 @@
   </p:defaultTextStyle>
   <p:extLst>
     <p:ext uri="{EFAFB233-063F-42B5-8137-9DF3F51BA10A}">
-      <p15:sldGuideLst xmlns="" xmlns:p15="http://schemas.microsoft.com/office/powerpoint/2012/main">
+      <p15:sldGuideLst xmlns:p15="http://schemas.microsoft.com/office/powerpoint/2012/main" xmlns="">
         <p15:guide id="1" orient="horz" pos="2160">
           <p15:clr>
             <a:srgbClr val="A4A3A4"/>
@@ -3708,6 +3708,60 @@
           </a:p>
         </p:txBody>
       </p:sp>
+      <p:pic>
+        <p:nvPicPr>
+          <p:cNvPr id="1026" name="Picture 2"/>
+          <p:cNvPicPr>
+            <a:picLocks noChangeAspect="1" noChangeArrowheads="1"/>
+          </p:cNvPicPr>
+          <p:nvPr/>
+        </p:nvPicPr>
+        <p:blipFill>
+          <a:blip r:embed="rId2">
+            <a:extLst>
+              <a:ext uri="{28A0092B-C50C-407E-A947-70E740481C1C}">
+                <a14:useLocalDpi xmlns:a14="http://schemas.microsoft.com/office/drawing/2010/main" val="0"/>
+              </a:ext>
+            </a:extLst>
+          </a:blip>
+          <a:srcRect/>
+          <a:stretch>
+            <a:fillRect/>
+          </a:stretch>
+        </p:blipFill>
+        <p:spPr bwMode="auto">
+          <a:xfrm>
+            <a:off x="905853" y="1277692"/>
+            <a:ext cx="8421760" cy="5417937"/>
+          </a:xfrm>
+          <a:prstGeom prst="rect">
+            <a:avLst/>
+          </a:prstGeom>
+          <a:noFill/>
+          <a:ln>
+            <a:noFill/>
+          </a:ln>
+          <a:extLst>
+            <a:ext uri="{909E8E84-426E-40DD-AFC4-6F175D3DCCD1}">
+              <a14:hiddenFill xmlns:a14="http://schemas.microsoft.com/office/drawing/2010/main">
+                <a:solidFill>
+                  <a:schemeClr val="accent1"/>
+                </a:solidFill>
+              </a14:hiddenFill>
+            </a:ext>
+            <a:ext uri="{91240B29-F687-4F45-9708-019B960494DF}">
+              <a14:hiddenLine xmlns:a14="http://schemas.microsoft.com/office/drawing/2010/main" w="9525">
+                <a:solidFill>
+                  <a:schemeClr val="tx1"/>
+                </a:solidFill>
+                <a:miter lim="800000"/>
+                <a:headEnd/>
+                <a:tailEnd/>
+              </a14:hiddenLine>
+            </a:ext>
+          </a:extLst>
+        </p:spPr>
+      </p:pic>
     </p:spTree>
     <p:extLst>
       <p:ext uri="{BB962C8B-B14F-4D97-AF65-F5344CB8AC3E}">
@@ -4082,7 +4136,7 @@
   <a:extraClrSchemeLst/>
   <a:extLst>
     <a:ext uri="{05A4C25C-085E-4340-85A3-A5531E510DB2}">
-      <thm15:themeFamily xmlns="" xmlns:thm15="http://schemas.microsoft.com/office/thememl/2012/main" name="Office Theme" id="{62F939B6-93AF-4DB8-9C6B-D6C7DFDC589F}" vid="{4A3C46E8-61CC-4603-A589-7422A47A8E4A}"/>
+      <thm15:themeFamily xmlns:thm15="http://schemas.microsoft.com/office/thememl/2012/main" xmlns="" name="Office Theme" id="{62F939B6-93AF-4DB8-9C6B-D6C7DFDC589F}" vid="{4A3C46E8-61CC-4603-A589-7422A47A8E4A}"/>
     </a:ext>
   </a:extLst>
 </a:theme>

</xml_diff>

<commit_message>
Update Präsentation - Final Version
</commit_message>
<xml_diff>
--- a/doc/task03/Task3.pptx
+++ b/doc/task03/Task3.pptx
@@ -5,23 +5,24 @@
     <p:sldMasterId id="2147483648" r:id="rId1"/>
   </p:sldMasterIdLst>
   <p:notesMasterIdLst>
-    <p:notesMasterId r:id="rId16"/>
+    <p:notesMasterId r:id="rId17"/>
   </p:notesMasterIdLst>
   <p:sldIdLst>
-    <p:sldId id="256" r:id="rId2"/>
-    <p:sldId id="257" r:id="rId3"/>
-    <p:sldId id="258" r:id="rId4"/>
-    <p:sldId id="259" r:id="rId5"/>
-    <p:sldId id="260" r:id="rId6"/>
-    <p:sldId id="261" r:id="rId7"/>
-    <p:sldId id="262" r:id="rId8"/>
-    <p:sldId id="263" r:id="rId9"/>
+    <p:sldId id="270" r:id="rId2"/>
+    <p:sldId id="271" r:id="rId3"/>
+    <p:sldId id="272" r:id="rId4"/>
+    <p:sldId id="273" r:id="rId5"/>
+    <p:sldId id="261" r:id="rId6"/>
+    <p:sldId id="262" r:id="rId7"/>
+    <p:sldId id="263" r:id="rId8"/>
+    <p:sldId id="274" r:id="rId9"/>
     <p:sldId id="264" r:id="rId10"/>
     <p:sldId id="265" r:id="rId11"/>
     <p:sldId id="266" r:id="rId12"/>
-    <p:sldId id="267" r:id="rId13"/>
-    <p:sldId id="268" r:id="rId14"/>
-    <p:sldId id="269" r:id="rId15"/>
+    <p:sldId id="275" r:id="rId13"/>
+    <p:sldId id="276" r:id="rId14"/>
+    <p:sldId id="277" r:id="rId15"/>
+    <p:sldId id="269" r:id="rId16"/>
   </p:sldIdLst>
   <p:sldSz cx="12192000" cy="6858000"/>
   <p:notesSz cx="6858000" cy="9144000"/>
@@ -122,7 +123,7 @@
   </p:defaultTextStyle>
   <p:extLst>
     <p:ext uri="{EFAFB233-063F-42B5-8137-9DF3F51BA10A}">
-      <p15:sldGuideLst xmlns:p15="http://schemas.microsoft.com/office/powerpoint/2012/main" xmlns="">
+      <p15:sldGuideLst xmlns:p15="http://schemas.microsoft.com/office/powerpoint/2012/main">
         <p15:guide id="1" orient="horz" pos="2160">
           <p15:clr>
             <a:srgbClr val="A4A3A4"/>
@@ -389,6 +390,11 @@
         </p:txBody>
       </p:sp>
     </p:spTree>
+    <p:extLst>
+      <p:ext uri="{BB962C8B-B14F-4D97-AF65-F5344CB8AC3E}">
+        <p14:creationId xmlns:p14="http://schemas.microsoft.com/office/powerpoint/2010/main" val="1620115385"/>
+      </p:ext>
+    </p:extLst>
   </p:cSld>
   <p:clrMap bg1="lt1" tx1="dk1" bg2="lt2" tx2="dk2" accent1="accent1" accent2="accent2" accent3="accent3" accent4="accent4" accent5="accent5" accent6="accent6" hlink="hlink" folHlink="folHlink"/>
   <p:notesStyle>
@@ -616,6 +622,11 @@
         </p:txBody>
       </p:sp>
     </p:spTree>
+    <p:extLst>
+      <p:ext uri="{BB962C8B-B14F-4D97-AF65-F5344CB8AC3E}">
+        <p14:creationId xmlns:p14="http://schemas.microsoft.com/office/powerpoint/2010/main" val="3135827359"/>
+      </p:ext>
+    </p:extLst>
   </p:cSld>
   <p:clrMapOvr>
     <a:masterClrMapping/>
@@ -669,25 +680,23 @@
           </a:bodyPr>
           <a:lstStyle/>
           <a:p>
+            <a:pPr>
+              <a:buFont typeface="Arial" pitchFamily="34" charset="0"/>
+              <a:buChar char="•"/>
+            </a:pPr>
+            <a:r>
+              <a:rPr lang="de-CH" dirty="0" smtClean="0"/>
+              <a:t>Einnahmezeiten flexibler gestalten als fix Mo/Mi/Ab bei der Medikation</a:t>
+            </a:r>
+          </a:p>
+          <a:p>
             <a:pPr lvl="0">
               <a:buFont typeface="Arial" pitchFamily="34" charset="0"/>
               <a:buChar char="•"/>
             </a:pPr>
             <a:r>
-              <a:rPr lang="de-CH" dirty="0" err="1" smtClean="0"/>
-              <a:t>Must</a:t>
-            </a:r>
-            <a:r>
               <a:rPr lang="de-CH" dirty="0" smtClean="0"/>
-              <a:t> </a:t>
-            </a:r>
-            <a:r>
-              <a:rPr lang="de-CH" dirty="0" err="1" smtClean="0"/>
-              <a:t>features</a:t>
-            </a:r>
-            <a:r>
-              <a:rPr lang="de-CH" dirty="0" smtClean="0"/>
-              <a:t>:</a:t>
+              <a:t> Warnhirnweis sichtbar bei erster Konsultation mit aggressivem Patient</a:t>
             </a:r>
           </a:p>
           <a:p>
@@ -697,7 +706,7 @@
             </a:pPr>
             <a:r>
               <a:rPr lang="de-CH" dirty="0" smtClean="0"/>
-              <a:t>Benachrichtigung  falls Administration E-Mail einem für Psychiater relevanten Fall ablegt</a:t>
+              <a:t>nur wenige vordefinierte Felder anlegen  für Text: Medikation /Rest aufteilen </a:t>
             </a:r>
           </a:p>
           <a:p>
@@ -707,22 +716,8 @@
             </a:pPr>
             <a:r>
               <a:rPr lang="de-CH" dirty="0" smtClean="0"/>
-              <a:t>Wechselwirkungen mit noch nicht einem Fall zugeordnetem Medikament  unabhängig ob Psychiater oder Administration Medikament erfasst hatte gut sichtbar als Warnhinweise anzeigen</a:t>
-            </a:r>
-          </a:p>
-          <a:p>
-            <a:pPr lvl="0">
-              <a:buFont typeface="Arial" pitchFamily="34" charset="0"/>
-              <a:buChar char="•"/>
-            </a:pPr>
-            <a:endParaRPr lang="de-CH" dirty="0" smtClean="0"/>
-          </a:p>
-          <a:p>
-            <a:pPr lvl="0">
-              <a:buFont typeface="Arial" pitchFamily="34" charset="0"/>
-              <a:buChar char="•"/>
-            </a:pPr>
-            <a:endParaRPr lang="de-CH" dirty="0" smtClean="0"/>
+              <a:t>GUI intuitiv und einfach machen</a:t>
+            </a:r>
           </a:p>
           <a:p>
             <a:endParaRPr lang="de-CH" dirty="0"/>
@@ -753,127 +748,11 @@
         </p:txBody>
       </p:sp>
     </p:spTree>
-  </p:cSld>
-  <p:clrMapOvr>
-    <a:masterClrMapping/>
-  </p:clrMapOvr>
-</p:notes>
-</file>
-
-<file path=ppt/notesSlides/notesSlide3.xml><?xml version="1.0" encoding="utf-8"?>
-<p:notes xmlns:a="http://schemas.openxmlformats.org/drawingml/2006/main" xmlns:r="http://schemas.openxmlformats.org/officeDocument/2006/relationships" xmlns:p="http://schemas.openxmlformats.org/presentationml/2006/main">
-  <p:cSld>
-    <p:spTree>
-      <p:nvGrpSpPr>
-        <p:cNvPr id="1" name=""/>
-        <p:cNvGrpSpPr/>
-        <p:nvPr/>
-      </p:nvGrpSpPr>
-      <p:grpSpPr>
-        <a:xfrm>
-          <a:off x="0" y="0"/>
-          <a:ext cx="0" cy="0"/>
-          <a:chOff x="0" y="0"/>
-          <a:chExt cx="0" cy="0"/>
-        </a:xfrm>
-      </p:grpSpPr>
-      <p:sp>
-        <p:nvSpPr>
-          <p:cNvPr id="2" name="Folienbildplatzhalter 1"/>
-          <p:cNvSpPr>
-            <a:spLocks noGrp="1" noRot="1" noChangeAspect="1"/>
-          </p:cNvSpPr>
-          <p:nvPr>
-            <p:ph type="sldImg"/>
-          </p:nvPr>
-        </p:nvSpPr>
-        <p:spPr/>
-      </p:sp>
-      <p:sp>
-        <p:nvSpPr>
-          <p:cNvPr id="3" name="Notizenplatzhalter 2"/>
-          <p:cNvSpPr>
-            <a:spLocks noGrp="1"/>
-          </p:cNvSpPr>
-          <p:nvPr>
-            <p:ph type="body" idx="1"/>
-          </p:nvPr>
-        </p:nvSpPr>
-        <p:spPr/>
-        <p:txBody>
-          <a:bodyPr>
-            <a:normAutofit/>
-          </a:bodyPr>
-          <a:lstStyle/>
-          <a:p>
-            <a:pPr>
-              <a:buFont typeface="Arial" pitchFamily="34" charset="0"/>
-              <a:buChar char="•"/>
-            </a:pPr>
-            <a:r>
-              <a:rPr lang="de-CH" dirty="0" smtClean="0"/>
-              <a:t>Einnahmezeiten flexibler gestalten als fix Mo/Mi/Ab bei der Medikation</a:t>
-            </a:r>
-          </a:p>
-          <a:p>
-            <a:pPr lvl="0">
-              <a:buFont typeface="Arial" pitchFamily="34" charset="0"/>
-              <a:buChar char="•"/>
-            </a:pPr>
-            <a:r>
-              <a:rPr lang="de-CH" dirty="0" smtClean="0"/>
-              <a:t> Warnhirnweis sichtbar bei erster Konsultation mit aggressivem Patient</a:t>
-            </a:r>
-          </a:p>
-          <a:p>
-            <a:pPr lvl="0">
-              <a:buFont typeface="Arial" pitchFamily="34" charset="0"/>
-              <a:buChar char="•"/>
-            </a:pPr>
-            <a:r>
-              <a:rPr lang="de-CH" dirty="0" smtClean="0"/>
-              <a:t>nur wenige vordefinierte Felder anlegen  für Text: Medikation /Rest aufteilen </a:t>
-            </a:r>
-          </a:p>
-          <a:p>
-            <a:pPr lvl="0">
-              <a:buFont typeface="Arial" pitchFamily="34" charset="0"/>
-              <a:buChar char="•"/>
-            </a:pPr>
-            <a:r>
-              <a:rPr lang="de-CH" dirty="0" smtClean="0"/>
-              <a:t>GUI intuitiv und einfach machen</a:t>
-            </a:r>
-          </a:p>
-          <a:p>
-            <a:endParaRPr lang="de-CH" dirty="0"/>
-          </a:p>
-        </p:txBody>
-      </p:sp>
-      <p:sp>
-        <p:nvSpPr>
-          <p:cNvPr id="4" name="Foliennummernplatzhalter 3"/>
-          <p:cNvSpPr>
-            <a:spLocks noGrp="1"/>
-          </p:cNvSpPr>
-          <p:nvPr>
-            <p:ph type="sldNum" sz="quarter" idx="10"/>
-          </p:nvPr>
-        </p:nvSpPr>
-        <p:spPr/>
-        <p:txBody>
-          <a:bodyPr/>
-          <a:lstStyle/>
-          <a:p>
-            <a:fld id="{D3AA7685-C5A4-4A65-A5F5-0C50A8B9D2A2}" type="slidenum">
-              <a:rPr lang="de-CH" smtClean="0"/>
-              <a:t>7</a:t>
-            </a:fld>
-            <a:endParaRPr lang="de-CH"/>
-          </a:p>
-        </p:txBody>
-      </p:sp>
-    </p:spTree>
+    <p:extLst>
+      <p:ext uri="{BB962C8B-B14F-4D97-AF65-F5344CB8AC3E}">
+        <p14:creationId xmlns:p14="http://schemas.microsoft.com/office/powerpoint/2010/main" val="617375900"/>
+      </p:ext>
+    </p:extLst>
   </p:cSld>
   <p:clrMapOvr>
     <a:masterClrMapping/>
@@ -1065,7 +944,7 @@
     </p:spTree>
     <p:extLst>
       <p:ext uri="{BB962C8B-B14F-4D97-AF65-F5344CB8AC3E}">
-        <p14:creationId xmlns="" xmlns:p14="http://schemas.microsoft.com/office/powerpoint/2010/main" val="605441838"/>
+        <p14:creationId xmlns:p14="http://schemas.microsoft.com/office/powerpoint/2010/main" val="605441838"/>
       </p:ext>
     </p:extLst>
   </p:cSld>
@@ -1237,7 +1116,7 @@
     </p:spTree>
     <p:extLst>
       <p:ext uri="{BB962C8B-B14F-4D97-AF65-F5344CB8AC3E}">
-        <p14:creationId xmlns="" xmlns:p14="http://schemas.microsoft.com/office/powerpoint/2010/main" val="673689975"/>
+        <p14:creationId xmlns:p14="http://schemas.microsoft.com/office/powerpoint/2010/main" val="673689975"/>
       </p:ext>
     </p:extLst>
   </p:cSld>
@@ -1419,7 +1298,7 @@
     </p:spTree>
     <p:extLst>
       <p:ext uri="{BB962C8B-B14F-4D97-AF65-F5344CB8AC3E}">
-        <p14:creationId xmlns="" xmlns:p14="http://schemas.microsoft.com/office/powerpoint/2010/main" val="993211526"/>
+        <p14:creationId xmlns:p14="http://schemas.microsoft.com/office/powerpoint/2010/main" val="993211526"/>
       </p:ext>
     </p:extLst>
   </p:cSld>
@@ -1591,7 +1470,7 @@
     </p:spTree>
     <p:extLst>
       <p:ext uri="{BB962C8B-B14F-4D97-AF65-F5344CB8AC3E}">
-        <p14:creationId xmlns="" xmlns:p14="http://schemas.microsoft.com/office/powerpoint/2010/main" val="3369289212"/>
+        <p14:creationId xmlns:p14="http://schemas.microsoft.com/office/powerpoint/2010/main" val="3369289212"/>
       </p:ext>
     </p:extLst>
   </p:cSld>
@@ -1839,7 +1718,7 @@
     </p:spTree>
     <p:extLst>
       <p:ext uri="{BB962C8B-B14F-4D97-AF65-F5344CB8AC3E}">
-        <p14:creationId xmlns="" xmlns:p14="http://schemas.microsoft.com/office/powerpoint/2010/main" val="1277514231"/>
+        <p14:creationId xmlns:p14="http://schemas.microsoft.com/office/powerpoint/2010/main" val="1277514231"/>
       </p:ext>
     </p:extLst>
   </p:cSld>
@@ -2073,7 +1952,7 @@
     </p:spTree>
     <p:extLst>
       <p:ext uri="{BB962C8B-B14F-4D97-AF65-F5344CB8AC3E}">
-        <p14:creationId xmlns="" xmlns:p14="http://schemas.microsoft.com/office/powerpoint/2010/main" val="2285142390"/>
+        <p14:creationId xmlns:p14="http://schemas.microsoft.com/office/powerpoint/2010/main" val="2285142390"/>
       </p:ext>
     </p:extLst>
   </p:cSld>
@@ -2442,7 +2321,7 @@
     </p:spTree>
     <p:extLst>
       <p:ext uri="{BB962C8B-B14F-4D97-AF65-F5344CB8AC3E}">
-        <p14:creationId xmlns="" xmlns:p14="http://schemas.microsoft.com/office/powerpoint/2010/main" val="3033148871"/>
+        <p14:creationId xmlns:p14="http://schemas.microsoft.com/office/powerpoint/2010/main" val="3033148871"/>
       </p:ext>
     </p:extLst>
   </p:cSld>
@@ -2562,7 +2441,7 @@
     </p:spTree>
     <p:extLst>
       <p:ext uri="{BB962C8B-B14F-4D97-AF65-F5344CB8AC3E}">
-        <p14:creationId xmlns="" xmlns:p14="http://schemas.microsoft.com/office/powerpoint/2010/main" val="3769391421"/>
+        <p14:creationId xmlns:p14="http://schemas.microsoft.com/office/powerpoint/2010/main" val="3769391421"/>
       </p:ext>
     </p:extLst>
   </p:cSld>
@@ -2659,7 +2538,7 @@
     </p:spTree>
     <p:extLst>
       <p:ext uri="{BB962C8B-B14F-4D97-AF65-F5344CB8AC3E}">
-        <p14:creationId xmlns="" xmlns:p14="http://schemas.microsoft.com/office/powerpoint/2010/main" val="1570509689"/>
+        <p14:creationId xmlns:p14="http://schemas.microsoft.com/office/powerpoint/2010/main" val="1570509689"/>
       </p:ext>
     </p:extLst>
   </p:cSld>
@@ -2938,7 +2817,7 @@
     </p:spTree>
     <p:extLst>
       <p:ext uri="{BB962C8B-B14F-4D97-AF65-F5344CB8AC3E}">
-        <p14:creationId xmlns="" xmlns:p14="http://schemas.microsoft.com/office/powerpoint/2010/main" val="2824234176"/>
+        <p14:creationId xmlns:p14="http://schemas.microsoft.com/office/powerpoint/2010/main" val="2824234176"/>
       </p:ext>
     </p:extLst>
   </p:cSld>
@@ -3193,7 +3072,7 @@
     </p:spTree>
     <p:extLst>
       <p:ext uri="{BB962C8B-B14F-4D97-AF65-F5344CB8AC3E}">
-        <p14:creationId xmlns="" xmlns:p14="http://schemas.microsoft.com/office/powerpoint/2010/main" val="1192058867"/>
+        <p14:creationId xmlns:p14="http://schemas.microsoft.com/office/powerpoint/2010/main" val="1192058867"/>
       </p:ext>
     </p:extLst>
   </p:cSld>
@@ -3444,7 +3323,7 @@
     </p:spTree>
     <p:extLst>
       <p:ext uri="{BB962C8B-B14F-4D97-AF65-F5344CB8AC3E}">
-        <p14:creationId xmlns="" xmlns:p14="http://schemas.microsoft.com/office/powerpoint/2010/main" val="2960548485"/>
+        <p14:creationId xmlns:p14="http://schemas.microsoft.com/office/powerpoint/2010/main" val="2960548485"/>
       </p:ext>
     </p:extLst>
   </p:cSld>
@@ -3764,67 +3643,23 @@
       </p:grpSpPr>
       <p:sp>
         <p:nvSpPr>
-          <p:cNvPr id="2" name="Titel 1"/>
-          <p:cNvSpPr>
-            <a:spLocks noGrp="1"/>
-          </p:cNvSpPr>
-          <p:nvPr>
-            <p:ph type="ctrTitle"/>
+          <p:cNvPr id="3" name="Untertitel 2"/>
+          <p:cNvSpPr>
+            <a:spLocks noGrp="1"/>
+          </p:cNvSpPr>
+          <p:nvPr>
+            <p:ph type="subTitle" idx="1"/>
           </p:nvPr>
         </p:nvSpPr>
         <p:spPr/>
         <p:txBody>
           <a:bodyPr>
-            <a:normAutofit/>
+            <a:normAutofit lnSpcReduction="10000"/>
           </a:bodyPr>
           <a:lstStyle/>
           <a:p>
-            <a:r>
-              <a:rPr lang="de-CH" sz="7200" b="1" dirty="0" smtClean="0">
-                <a:solidFill>
-                  <a:srgbClr val="00B050"/>
-                </a:solidFill>
-                <a:effectLst>
-                  <a:outerShdw blurRad="38100" dist="38100" dir="2700000" algn="tl">
-                    <a:srgbClr val="000000">
-                      <a:alpha val="43137"/>
-                    </a:srgbClr>
-                  </a:outerShdw>
-                </a:effectLst>
-              </a:rPr>
-              <a:t>Team Green</a:t>
-            </a:r>
-            <a:endParaRPr lang="de-CH" sz="7200" b="1" dirty="0">
-              <a:solidFill>
-                <a:srgbClr val="00B050"/>
-              </a:solidFill>
-              <a:effectLst>
-                <a:outerShdw blurRad="38100" dist="38100" dir="2700000" algn="tl">
-                  <a:srgbClr val="000000">
-                    <a:alpha val="43137"/>
-                  </a:srgbClr>
-                </a:outerShdw>
-              </a:effectLst>
-            </a:endParaRPr>
-          </a:p>
-        </p:txBody>
-      </p:sp>
-      <p:sp>
-        <p:nvSpPr>
-          <p:cNvPr id="3" name="Untertitel 2"/>
-          <p:cNvSpPr>
-            <a:spLocks noGrp="1"/>
-          </p:cNvSpPr>
-          <p:nvPr>
-            <p:ph type="subTitle" idx="1"/>
-          </p:nvPr>
-        </p:nvSpPr>
-        <p:spPr/>
-        <p:txBody>
-          <a:bodyPr>
-            <a:normAutofit/>
-          </a:bodyPr>
-          <a:lstStyle/>
+            <a:endParaRPr lang="de-CH" sz="3200" dirty="0" smtClean="0"/>
+          </a:p>
           <a:p>
             <a:r>
               <a:rPr lang="de-CH" sz="3200" dirty="0" smtClean="0"/>
@@ -3845,10 +3680,40 @@
           </a:p>
         </p:txBody>
       </p:sp>
+      <p:pic>
+        <p:nvPicPr>
+          <p:cNvPr id="4" name="Grafik 3"/>
+          <p:cNvPicPr>
+            <a:picLocks noChangeAspect="1"/>
+          </p:cNvPicPr>
+          <p:nvPr/>
+        </p:nvPicPr>
+        <p:blipFill>
+          <a:blip r:embed="rId2">
+            <a:extLst>
+              <a:ext uri="{28A0092B-C50C-407E-A947-70E740481C1C}">
+                <a14:useLocalDpi xmlns:a14="http://schemas.microsoft.com/office/drawing/2010/main" val="0"/>
+              </a:ext>
+            </a:extLst>
+          </a:blip>
+          <a:stretch>
+            <a:fillRect/>
+          </a:stretch>
+        </p:blipFill>
+        <p:spPr>
+          <a:xfrm>
+            <a:off x="3095625" y="901992"/>
+            <a:ext cx="6000750" cy="3200400"/>
+          </a:xfrm>
+          <a:prstGeom prst="rect">
+            <a:avLst/>
+          </a:prstGeom>
+        </p:spPr>
+      </p:pic>
     </p:spTree>
     <p:extLst>
       <p:ext uri="{BB962C8B-B14F-4D97-AF65-F5344CB8AC3E}">
-        <p14:creationId xmlns="" xmlns:p14="http://schemas.microsoft.com/office/powerpoint/2010/main" val="926634784"/>
+        <p14:creationId xmlns:p14="http://schemas.microsoft.com/office/powerpoint/2010/main" val="2426850246"/>
       </p:ext>
     </p:extLst>
   </p:cSld>
@@ -3900,12 +3765,52 @@
           <a:lstStyle/>
           <a:p>
             <a:r>
+              <a:rPr lang="de-DE" b="1" dirty="0">
+                <a:solidFill>
+                  <a:srgbClr val="00B050"/>
+                </a:solidFill>
+              </a:rPr>
+              <a:t>3</a:t>
+            </a:r>
+            <a:r>
               <a:rPr lang="de-DE" b="1" dirty="0" smtClean="0">
                 <a:solidFill>
                   <a:srgbClr val="00B050"/>
                 </a:solidFill>
               </a:rPr>
-              <a:t>4. Design: Mainfeatures</a:t>
+              <a:t>. </a:t>
+            </a:r>
+            <a:r>
+              <a:rPr lang="de-DE" b="1" dirty="0" err="1" smtClean="0">
+                <a:solidFill>
+                  <a:srgbClr val="00B050"/>
+                </a:solidFill>
+              </a:rPr>
+              <a:t>Synthesize</a:t>
+            </a:r>
+            <a:r>
+              <a:rPr lang="de-DE" b="1" dirty="0" smtClean="0">
+                <a:solidFill>
+                  <a:srgbClr val="00B050"/>
+                </a:solidFill>
+              </a:rPr>
+              <a:t>: Main </a:t>
+            </a:r>
+            <a:r>
+              <a:rPr lang="de-DE" b="1" dirty="0">
+                <a:solidFill>
+                  <a:srgbClr val="00B050"/>
+                </a:solidFill>
+              </a:rPr>
+              <a:t>F</a:t>
+            </a:r>
+            <a:r>
+              <a:rPr lang="de-DE" b="1" dirty="0" smtClean="0">
+                <a:solidFill>
+                  <a:srgbClr val="00B050"/>
+                </a:solidFill>
+              </a:rPr>
+              <a:t>eatures</a:t>
             </a:r>
             <a:endParaRPr lang="en-GB" b="1" dirty="0">
               <a:solidFill>
@@ -3915,41 +3820,19 @@
           </a:p>
         </p:txBody>
       </p:sp>
-      <p:sp>
-        <p:nvSpPr>
-          <p:cNvPr id="3" name="Inhaltsplatzhalter 2"/>
-          <p:cNvSpPr>
-            <a:spLocks noGrp="1"/>
-          </p:cNvSpPr>
-          <p:nvPr>
-            <p:ph idx="1"/>
-          </p:nvPr>
-        </p:nvSpPr>
-        <p:spPr>
-          <a:xfrm>
-            <a:off x="1002890" y="1622323"/>
-            <a:ext cx="8863781" cy="4277031"/>
-          </a:xfrm>
-        </p:spPr>
-        <p:txBody>
-          <a:bodyPr/>
-          <a:lstStyle/>
-          <a:p>
-            <a:endParaRPr lang="en-GB" dirty="0"/>
-          </a:p>
-        </p:txBody>
-      </p:sp>
       <p:pic>
         <p:nvPicPr>
-          <p:cNvPr id="6" name="Grafik 6"/>
-          <p:cNvPicPr/>
+          <p:cNvPr id="5" name="Grafik 4"/>
+          <p:cNvPicPr>
+            <a:picLocks noChangeAspect="1"/>
+          </p:cNvPicPr>
           <p:nvPr/>
         </p:nvPicPr>
         <p:blipFill>
           <a:blip r:embed="rId2">
             <a:extLst>
               <a:ext uri="{28A0092B-C50C-407E-A947-70E740481C1C}">
-                <a14:useLocalDpi xmlns="" xmlns:wpc="http://schemas.microsoft.com/office/word/2010/wordprocessingCanvas" xmlns:mc="http://schemas.openxmlformats.org/markup-compatibility/2006" xmlns:o="urn:schemas-microsoft-com:office:office" xmlns:m="http://schemas.openxmlformats.org/officeDocument/2006/math" xmlns:v="urn:schemas-microsoft-com:vml" xmlns:wp14="http://schemas.microsoft.com/office/word/2010/wordprocessingDrawing" xmlns:wp="http://schemas.openxmlformats.org/drawingml/2006/wordprocessingDrawing" xmlns:w10="urn:schemas-microsoft-com:office:word" xmlns:w="http://schemas.openxmlformats.org/wordprocessingml/2006/main" xmlns:w14="http://schemas.microsoft.com/office/word/2010/wordml" xmlns:wpg="http://schemas.microsoft.com/office/word/2010/wordprocessingGroup" xmlns:wpi="http://schemas.microsoft.com/office/word/2010/wordprocessingInk" xmlns:wne="http://schemas.microsoft.com/office/word/2006/wordml" xmlns:wps="http://schemas.microsoft.com/office/word/2010/wordprocessingShape" xmlns:a14="http://schemas.microsoft.com/office/drawing/2010/main" xmlns:pic="http://schemas.openxmlformats.org/drawingml/2006/picture" xmlns:lc="http://schemas.openxmlformats.org/drawingml/2006/lockedCanvas" val="0"/>
+                <a14:useLocalDpi xmlns:a14="http://schemas.microsoft.com/office/drawing/2010/main" val="0"/>
               </a:ext>
             </a:extLst>
           </a:blip>
@@ -3959,8 +3842,8 @@
         </p:blipFill>
         <p:spPr>
           <a:xfrm>
-            <a:off x="412378" y="1434353"/>
-            <a:ext cx="11205882" cy="4652682"/>
+            <a:off x="838200" y="1543050"/>
+            <a:ext cx="10932006" cy="4746792"/>
           </a:xfrm>
           <a:prstGeom prst="rect">
             <a:avLst/>
@@ -3970,7 +3853,7 @@
     </p:spTree>
     <p:extLst>
       <p:ext uri="{BB962C8B-B14F-4D97-AF65-F5344CB8AC3E}">
-        <p14:creationId xmlns="" xmlns:p14="http://schemas.microsoft.com/office/powerpoint/2010/main" val="731336380"/>
+        <p14:creationId xmlns:p14="http://schemas.microsoft.com/office/powerpoint/2010/main" val="731336380"/>
       </p:ext>
     </p:extLst>
   </p:cSld>
@@ -4094,7 +3977,7 @@
           <a:blip r:embed="rId2">
             <a:extLst>
               <a:ext uri="{28A0092B-C50C-407E-A947-70E740481C1C}">
-                <a14:useLocalDpi xmlns="" xmlns:a14="http://schemas.microsoft.com/office/drawing/2010/main" val="0"/>
+                <a14:useLocalDpi xmlns:a14="http://schemas.microsoft.com/office/drawing/2010/main" val="0"/>
               </a:ext>
             </a:extLst>
           </a:blip>
@@ -4117,14 +4000,14 @@
           </a:ln>
           <a:extLst>
             <a:ext uri="{909E8E84-426E-40DD-AFC4-6F175D3DCCD1}">
-              <a14:hiddenFill xmlns="" xmlns:a14="http://schemas.microsoft.com/office/drawing/2010/main">
+              <a14:hiddenFill xmlns:a14="http://schemas.microsoft.com/office/drawing/2010/main">
                 <a:solidFill>
                   <a:schemeClr val="accent1"/>
                 </a:solidFill>
               </a14:hiddenFill>
             </a:ext>
             <a:ext uri="{91240B29-F687-4F45-9708-019B960494DF}">
-              <a14:hiddenLine xmlns="" xmlns:a14="http://schemas.microsoft.com/office/drawing/2010/main" w="9525">
+              <a14:hiddenLine xmlns:a14="http://schemas.microsoft.com/office/drawing/2010/main" w="9525">
                 <a:solidFill>
                   <a:schemeClr val="tx1"/>
                 </a:solidFill>
@@ -4139,7 +4022,7 @@
     </p:spTree>
     <p:extLst>
       <p:ext uri="{BB962C8B-B14F-4D97-AF65-F5344CB8AC3E}">
-        <p14:creationId xmlns="" xmlns:p14="http://schemas.microsoft.com/office/powerpoint/2010/main" val="2162464782"/>
+        <p14:creationId xmlns:p14="http://schemas.microsoft.com/office/powerpoint/2010/main" val="2162464782"/>
       </p:ext>
     </p:extLst>
   </p:cSld>
@@ -4189,20 +4072,20 @@
           <a:lstStyle/>
           <a:p>
             <a:r>
+              <a:rPr lang="de-DE" b="1" dirty="0">
+                <a:solidFill>
+                  <a:srgbClr val="00B050"/>
+                </a:solidFill>
+              </a:rPr>
+              <a:t>5</a:t>
+            </a:r>
+            <a:r>
               <a:rPr lang="de-DE" b="1" dirty="0" smtClean="0">
                 <a:solidFill>
                   <a:srgbClr val="00B050"/>
                 </a:solidFill>
               </a:rPr>
-              <a:t>4. Design</a:t>
-            </a:r>
-            <a:r>
-              <a:rPr lang="de-DE" b="1" dirty="0">
-                <a:solidFill>
-                  <a:srgbClr val="00B050"/>
-                </a:solidFill>
-              </a:rPr>
-              <a:t>: </a:t>
+              <a:t>. </a:t>
             </a:r>
             <a:r>
               <a:rPr lang="de-DE" b="1" dirty="0" err="1" smtClean="0">
@@ -4218,31 +4101,38 @@
       </p:sp>
       <p:pic>
         <p:nvPicPr>
-          <p:cNvPr id="5" name="Inhaltsplatzhalter 4" descr="Prototyp_agenda.jpg"/>
+          <p:cNvPr id="4" name="Grafik 3"/>
           <p:cNvPicPr>
-            <a:picLocks noGrp="1" noChangeAspect="1"/>
+            <a:picLocks noChangeAspect="1"/>
           </p:cNvPicPr>
-          <p:nvPr>
-            <p:ph idx="1"/>
-          </p:nvPr>
+          <p:nvPr/>
         </p:nvPicPr>
         <p:blipFill>
-          <a:blip r:embed="rId2"/>
+          <a:blip r:embed="rId2">
+            <a:extLst>
+              <a:ext uri="{28A0092B-C50C-407E-A947-70E740481C1C}">
+                <a14:useLocalDpi xmlns:a14="http://schemas.microsoft.com/office/drawing/2010/main" val="0"/>
+              </a:ext>
+            </a:extLst>
+          </a:blip>
           <a:stretch>
             <a:fillRect/>
           </a:stretch>
         </p:blipFill>
         <p:spPr>
           <a:xfrm>
-            <a:off x="2228144" y="1825625"/>
-            <a:ext cx="7735712" cy="4351338"/>
+            <a:off x="1422400" y="1456690"/>
+            <a:ext cx="9347200" cy="5257800"/>
           </a:xfrm>
+          <a:prstGeom prst="rect">
+            <a:avLst/>
+          </a:prstGeom>
         </p:spPr>
       </p:pic>
     </p:spTree>
     <p:extLst>
       <p:ext uri="{BB962C8B-B14F-4D97-AF65-F5344CB8AC3E}">
-        <p14:creationId xmlns="" xmlns:p14="http://schemas.microsoft.com/office/powerpoint/2010/main" val="3841519463"/>
+        <p14:creationId xmlns:p14="http://schemas.microsoft.com/office/powerpoint/2010/main" val="1890939391"/>
       </p:ext>
     </p:extLst>
   </p:cSld>
@@ -4297,15 +4187,7 @@
                   <a:srgbClr val="00B050"/>
                 </a:solidFill>
               </a:rPr>
-              <a:t>4. Design</a:t>
-            </a:r>
-            <a:r>
-              <a:rPr lang="de-DE" b="1" dirty="0">
-                <a:solidFill>
-                  <a:srgbClr val="00B050"/>
-                </a:solidFill>
-              </a:rPr>
-              <a:t>: </a:t>
+              <a:t>5. </a:t>
             </a:r>
             <a:r>
               <a:rPr lang="de-DE" b="1" dirty="0" err="1" smtClean="0">
@@ -4321,31 +4203,38 @@
       </p:sp>
       <p:pic>
         <p:nvPicPr>
-          <p:cNvPr id="6" name="Inhaltsplatzhalter 5" descr="Prototyp_uebersicht.jpg"/>
+          <p:cNvPr id="4" name="Grafik 3"/>
           <p:cNvPicPr>
-            <a:picLocks noGrp="1" noChangeAspect="1"/>
+            <a:picLocks noChangeAspect="1"/>
           </p:cNvPicPr>
-          <p:nvPr>
-            <p:ph idx="1"/>
-          </p:nvPr>
+          <p:nvPr/>
         </p:nvPicPr>
         <p:blipFill>
-          <a:blip r:embed="rId2"/>
+          <a:blip r:embed="rId2">
+            <a:extLst>
+              <a:ext uri="{28A0092B-C50C-407E-A947-70E740481C1C}">
+                <a14:useLocalDpi xmlns:a14="http://schemas.microsoft.com/office/drawing/2010/main" val="0"/>
+              </a:ext>
+            </a:extLst>
+          </a:blip>
           <a:stretch>
             <a:fillRect/>
           </a:stretch>
         </p:blipFill>
         <p:spPr>
           <a:xfrm>
-            <a:off x="2228144" y="1825625"/>
-            <a:ext cx="7735712" cy="4351338"/>
+            <a:off x="1455420" y="1474786"/>
+            <a:ext cx="9281160" cy="5220653"/>
           </a:xfrm>
+          <a:prstGeom prst="rect">
+            <a:avLst/>
+          </a:prstGeom>
         </p:spPr>
       </p:pic>
     </p:spTree>
     <p:extLst>
       <p:ext uri="{BB962C8B-B14F-4D97-AF65-F5344CB8AC3E}">
-        <p14:creationId xmlns="" xmlns:p14="http://schemas.microsoft.com/office/powerpoint/2010/main" val="3841519463"/>
+        <p14:creationId xmlns:p14="http://schemas.microsoft.com/office/powerpoint/2010/main" val="767570878"/>
       </p:ext>
     </p:extLst>
   </p:cSld>
@@ -4400,7 +4289,187 @@
                   <a:srgbClr val="00B050"/>
                 </a:solidFill>
               </a:rPr>
-              <a:t>5. </a:t>
+              <a:t>6</a:t>
+            </a:r>
+            <a:r>
+              <a:rPr lang="de-DE" b="1" dirty="0" smtClean="0">
+                <a:solidFill>
+                  <a:srgbClr val="00B050"/>
+                </a:solidFill>
+              </a:rPr>
+              <a:t>. Validation</a:t>
+            </a:r>
+            <a:endParaRPr lang="en-GB" dirty="0"/>
+          </a:p>
+        </p:txBody>
+      </p:sp>
+      <p:sp>
+        <p:nvSpPr>
+          <p:cNvPr id="3" name="Inhaltsplatzhalter 2"/>
+          <p:cNvSpPr>
+            <a:spLocks noGrp="1"/>
+          </p:cNvSpPr>
+          <p:nvPr>
+            <p:ph idx="1"/>
+          </p:nvPr>
+        </p:nvSpPr>
+        <p:spPr>
+          <a:xfrm>
+            <a:off x="838200" y="1825624"/>
+            <a:ext cx="9706897" cy="4595495"/>
+          </a:xfrm>
+        </p:spPr>
+        <p:txBody>
+          <a:bodyPr>
+            <a:normAutofit/>
+          </a:bodyPr>
+          <a:lstStyle/>
+          <a:p>
+            <a:r>
+              <a:rPr lang="de-CH" dirty="0" smtClean="0"/>
+              <a:t>Erneutes Treffen mit Herrn Lehmann</a:t>
+            </a:r>
+            <a:endParaRPr lang="de-CH" dirty="0" smtClean="0"/>
+          </a:p>
+          <a:p>
+            <a:pPr lvl="1"/>
+            <a:r>
+              <a:rPr lang="de-CH" dirty="0" smtClean="0"/>
+              <a:t>Zusätzlich integrieren:</a:t>
+            </a:r>
+          </a:p>
+          <a:p>
+            <a:pPr lvl="2"/>
+            <a:r>
+              <a:rPr lang="de-CH" dirty="0" smtClean="0"/>
+              <a:t>Sprung aus Terminübersicht zu Patient und zurück</a:t>
+            </a:r>
+            <a:endParaRPr lang="de-CH" dirty="0" smtClean="0"/>
+          </a:p>
+          <a:p>
+            <a:pPr lvl="1"/>
+            <a:r>
+              <a:rPr lang="de-CH" dirty="0" smtClean="0"/>
+              <a:t>Out </a:t>
+            </a:r>
+            <a:r>
+              <a:rPr lang="de-CH" dirty="0" err="1" smtClean="0"/>
+              <a:t>of</a:t>
+            </a:r>
+            <a:r>
+              <a:rPr lang="de-CH" dirty="0" smtClean="0"/>
+              <a:t> </a:t>
+            </a:r>
+            <a:r>
+              <a:rPr lang="de-CH" dirty="0" err="1" smtClean="0"/>
+              <a:t>Scope</a:t>
+            </a:r>
+            <a:endParaRPr lang="de-CH" dirty="0" smtClean="0"/>
+          </a:p>
+          <a:p>
+            <a:pPr lvl="2"/>
+            <a:r>
+              <a:rPr lang="de-CH" dirty="0" smtClean="0"/>
+              <a:t>Chat Funktion </a:t>
+            </a:r>
+            <a:r>
+              <a:rPr lang="de-CH" dirty="0" smtClean="0">
+                <a:sym typeface="Wingdings" panose="05000000000000000000" pitchFamily="2" charset="2"/>
+              </a:rPr>
+              <a:t> Abrechnung</a:t>
+            </a:r>
+          </a:p>
+          <a:p>
+            <a:pPr lvl="2"/>
+            <a:r>
+              <a:rPr lang="de-CH" dirty="0" smtClean="0">
+                <a:sym typeface="Wingdings" panose="05000000000000000000" pitchFamily="2" charset="2"/>
+              </a:rPr>
+              <a:t>Medikations-Bestätigung vs. Vertrauen</a:t>
+            </a:r>
+            <a:endParaRPr lang="de-CH" dirty="0"/>
+          </a:p>
+          <a:p>
+            <a:pPr marL="457200" lvl="1" indent="0">
+              <a:buNone/>
+            </a:pPr>
+            <a:endParaRPr lang="de-CH" dirty="0"/>
+          </a:p>
+          <a:p>
+            <a:pPr marL="0" indent="0">
+              <a:buNone/>
+            </a:pPr>
+            <a:endParaRPr lang="de-CH" dirty="0"/>
+          </a:p>
+        </p:txBody>
+      </p:sp>
+    </p:spTree>
+    <p:extLst>
+      <p:ext uri="{BB962C8B-B14F-4D97-AF65-F5344CB8AC3E}">
+        <p14:creationId xmlns:p14="http://schemas.microsoft.com/office/powerpoint/2010/main" val="204938600"/>
+      </p:ext>
+    </p:extLst>
+  </p:cSld>
+  <p:clrMapOvr>
+    <a:masterClrMapping/>
+  </p:clrMapOvr>
+  <p:timing>
+    <p:tnLst>
+      <p:par>
+        <p:cTn id="1" dur="indefinite" restart="never" nodeType="tmRoot"/>
+      </p:par>
+    </p:tnLst>
+  </p:timing>
+</p:sld>
+</file>
+
+<file path=ppt/slides/slide15.xml><?xml version="1.0" encoding="utf-8"?>
+<p:sld xmlns:a="http://schemas.openxmlformats.org/drawingml/2006/main" xmlns:r="http://schemas.openxmlformats.org/officeDocument/2006/relationships" xmlns:p="http://schemas.openxmlformats.org/presentationml/2006/main">
+  <p:cSld>
+    <p:spTree>
+      <p:nvGrpSpPr>
+        <p:cNvPr id="1" name=""/>
+        <p:cNvGrpSpPr/>
+        <p:nvPr/>
+      </p:nvGrpSpPr>
+      <p:grpSpPr>
+        <a:xfrm>
+          <a:off x="0" y="0"/>
+          <a:ext cx="0" cy="0"/>
+          <a:chOff x="0" y="0"/>
+          <a:chExt cx="0" cy="0"/>
+        </a:xfrm>
+      </p:grpSpPr>
+      <p:sp>
+        <p:nvSpPr>
+          <p:cNvPr id="2" name="Titel 1"/>
+          <p:cNvSpPr>
+            <a:spLocks noGrp="1"/>
+          </p:cNvSpPr>
+          <p:nvPr>
+            <p:ph type="title"/>
+          </p:nvPr>
+        </p:nvSpPr>
+        <p:spPr/>
+        <p:txBody>
+          <a:bodyPr/>
+          <a:lstStyle/>
+          <a:p>
+            <a:r>
+              <a:rPr lang="de-DE" b="1" dirty="0">
+                <a:solidFill>
+                  <a:srgbClr val="00B050"/>
+                </a:solidFill>
+              </a:rPr>
+              <a:t>7</a:t>
+            </a:r>
+            <a:r>
+              <a:rPr lang="de-DE" b="1" dirty="0" smtClean="0">
+                <a:solidFill>
+                  <a:srgbClr val="00B050"/>
+                </a:solidFill>
+              </a:rPr>
+              <a:t>. </a:t>
             </a:r>
             <a:r>
               <a:rPr lang="de-DE" b="1" dirty="0" err="1" smtClean="0">
@@ -4416,7 +4485,7 @@
       </p:sp>
       <p:sp>
         <p:nvSpPr>
-          <p:cNvPr id="3" name="Inhaltsplatzhalter 2"/>
+          <p:cNvPr id="5" name="Inhaltsplatzhalter 2"/>
           <p:cNvSpPr>
             <a:spLocks noGrp="1"/>
           </p:cNvSpPr>
@@ -4426,8 +4495,8 @@
         </p:nvSpPr>
         <p:spPr>
           <a:xfrm>
-            <a:off x="2025869" y="2499327"/>
-            <a:ext cx="5289331" cy="1367279"/>
+            <a:off x="838200" y="1825624"/>
+            <a:ext cx="9706897" cy="4595495"/>
           </a:xfrm>
         </p:spPr>
         <p:txBody>
@@ -4436,25 +4505,66 @@
           </a:bodyPr>
           <a:lstStyle/>
           <a:p>
-            <a:pPr>
+            <a:r>
+              <a:rPr lang="de-CH" dirty="0" smtClean="0"/>
+              <a:t>Fragen?</a:t>
+            </a:r>
+            <a:endParaRPr lang="de-CH" dirty="0" smtClean="0"/>
+          </a:p>
+          <a:p>
+            <a:pPr marL="457200" lvl="1" indent="0">
               <a:buNone/>
             </a:pPr>
-            <a:r>
-              <a:rPr lang="en-GB" sz="2400" b="1" dirty="0" err="1" smtClean="0"/>
-              <a:t>Fragen</a:t>
-            </a:r>
-            <a:r>
-              <a:rPr lang="en-GB" sz="2400" b="1" dirty="0" smtClean="0"/>
-              <a:t>?</a:t>
-            </a:r>
-            <a:endParaRPr lang="en-GB" sz="2400" b="1" dirty="0" smtClean="0"/>
-          </a:p>
-        </p:txBody>
-      </p:sp>
+            <a:endParaRPr lang="de-CH" dirty="0"/>
+          </a:p>
+          <a:p>
+            <a:pPr marL="457200" lvl="1" indent="0">
+              <a:buNone/>
+            </a:pPr>
+            <a:endParaRPr lang="de-CH" dirty="0"/>
+          </a:p>
+          <a:p>
+            <a:pPr marL="0" indent="0">
+              <a:buNone/>
+            </a:pPr>
+            <a:endParaRPr lang="de-CH" dirty="0"/>
+          </a:p>
+        </p:txBody>
+      </p:sp>
+      <p:pic>
+        <p:nvPicPr>
+          <p:cNvPr id="7" name="Grafik 6"/>
+          <p:cNvPicPr>
+            <a:picLocks noChangeAspect="1"/>
+          </p:cNvPicPr>
+          <p:nvPr/>
+        </p:nvPicPr>
+        <p:blipFill>
+          <a:blip r:embed="rId2">
+            <a:extLst>
+              <a:ext uri="{28A0092B-C50C-407E-A947-70E740481C1C}">
+                <a14:useLocalDpi xmlns:a14="http://schemas.microsoft.com/office/drawing/2010/main" val="0"/>
+              </a:ext>
+            </a:extLst>
+          </a:blip>
+          <a:stretch>
+            <a:fillRect/>
+          </a:stretch>
+        </p:blipFill>
+        <p:spPr>
+          <a:xfrm>
+            <a:off x="4126756" y="2238055"/>
+            <a:ext cx="3938488" cy="4318000"/>
+          </a:xfrm>
+          <a:prstGeom prst="rect">
+            <a:avLst/>
+          </a:prstGeom>
+        </p:spPr>
+      </p:pic>
     </p:spTree>
     <p:extLst>
       <p:ext uri="{BB962C8B-B14F-4D97-AF65-F5344CB8AC3E}">
-        <p14:creationId xmlns="" xmlns:p14="http://schemas.microsoft.com/office/powerpoint/2010/main" val="3841519463"/>
+        <p14:creationId xmlns:p14="http://schemas.microsoft.com/office/powerpoint/2010/main" val="3841519463"/>
       </p:ext>
     </p:extLst>
   </p:cSld>
@@ -4527,9 +4637,15 @@
         </p:nvSpPr>
         <p:spPr/>
         <p:txBody>
-          <a:bodyPr/>
-          <a:lstStyle/>
-          <a:p>
+          <a:bodyPr>
+            <a:normAutofit/>
+          </a:bodyPr>
+          <a:lstStyle/>
+          <a:p>
+            <a:pPr marL="514350" indent="-514350">
+              <a:buFont typeface="+mj-lt"/>
+              <a:buAutoNum type="arabicPeriod"/>
+            </a:pPr>
             <a:r>
               <a:rPr lang="de-CH" dirty="0" err="1" smtClean="0"/>
               <a:t>Scoping</a:t>
@@ -4537,12 +4653,20 @@
             <a:endParaRPr lang="de-CH" dirty="0" smtClean="0"/>
           </a:p>
           <a:p>
+            <a:pPr marL="514350" indent="-514350">
+              <a:buFont typeface="+mj-lt"/>
+              <a:buAutoNum type="arabicPeriod"/>
+            </a:pPr>
             <a:r>
               <a:rPr lang="de-CH" dirty="0" smtClean="0"/>
               <a:t>Research</a:t>
             </a:r>
           </a:p>
           <a:p>
+            <a:pPr marL="514350" indent="-514350">
+              <a:buFont typeface="+mj-lt"/>
+              <a:buAutoNum type="arabicPeriod"/>
+            </a:pPr>
             <a:r>
               <a:rPr lang="de-CH" dirty="0" err="1" smtClean="0"/>
               <a:t>Synthesize</a:t>
@@ -4550,6 +4674,10 @@
             <a:endParaRPr lang="de-CH" dirty="0" smtClean="0"/>
           </a:p>
           <a:p>
+            <a:pPr marL="514350" indent="-514350">
+              <a:buFont typeface="+mj-lt"/>
+              <a:buAutoNum type="arabicPeriod"/>
+            </a:pPr>
             <a:r>
               <a:rPr lang="de-CH" dirty="0" smtClean="0"/>
               <a:t>Design</a:t>
@@ -4558,20 +4686,22 @@
           <a:p>
             <a:pPr lvl="1"/>
             <a:r>
+              <a:rPr lang="de-CH" dirty="0"/>
+              <a:t>Mainfeatures</a:t>
+            </a:r>
+          </a:p>
+          <a:p>
+            <a:pPr lvl="1"/>
+            <a:r>
               <a:rPr lang="de-CH" dirty="0" smtClean="0"/>
-              <a:t>Mainfeatures</a:t>
-            </a:r>
-          </a:p>
-          <a:p>
-            <a:pPr lvl="1"/>
-            <a:r>
-              <a:rPr lang="de-CH" dirty="0" err="1" smtClean="0"/>
               <a:t>Storyboard</a:t>
             </a:r>
-            <a:endParaRPr lang="de-CH" dirty="0" smtClean="0"/>
-          </a:p>
-          <a:p>
-            <a:pPr lvl="1"/>
+          </a:p>
+          <a:p>
+            <a:pPr marL="514350" indent="-514350">
+              <a:buFont typeface="+mj-lt"/>
+              <a:buAutoNum type="arabicPeriod"/>
+            </a:pPr>
             <a:r>
               <a:rPr lang="de-CH" dirty="0" err="1" smtClean="0"/>
               <a:t>Prototyping</a:t>
@@ -4579,6 +4709,21 @@
             <a:endParaRPr lang="de-CH" dirty="0" smtClean="0"/>
           </a:p>
           <a:p>
+            <a:pPr marL="514350" indent="-514350">
+              <a:buFont typeface="+mj-lt"/>
+              <a:buAutoNum type="arabicPeriod"/>
+            </a:pPr>
+            <a:r>
+              <a:rPr lang="de-CH" dirty="0" smtClean="0"/>
+              <a:t>Validation</a:t>
+            </a:r>
+            <a:endParaRPr lang="de-CH" dirty="0" smtClean="0"/>
+          </a:p>
+          <a:p>
+            <a:pPr marL="514350" indent="-514350">
+              <a:buFont typeface="+mj-lt"/>
+              <a:buAutoNum type="arabicPeriod"/>
+            </a:pPr>
             <a:r>
               <a:rPr lang="de-CH" dirty="0" err="1" smtClean="0"/>
               <a:t>Discussion</a:t>
@@ -4590,7 +4735,7 @@
     </p:spTree>
     <p:extLst>
       <p:ext uri="{BB962C8B-B14F-4D97-AF65-F5344CB8AC3E}">
-        <p14:creationId xmlns="" xmlns:p14="http://schemas.microsoft.com/office/powerpoint/2010/main" val="627735663"/>
+        <p14:creationId xmlns:p14="http://schemas.microsoft.com/office/powerpoint/2010/main" val="2073967750"/>
       </p:ext>
     </p:extLst>
   </p:cSld>
@@ -4665,124 +4810,168 @@
       </p:sp>
       <p:sp>
         <p:nvSpPr>
-          <p:cNvPr id="5" name="Rechteck 4"/>
-          <p:cNvSpPr/>
-          <p:nvPr/>
+          <p:cNvPr id="6" name="Inhaltsplatzhalter 2"/>
+          <p:cNvSpPr>
+            <a:spLocks noGrp="1"/>
+          </p:cNvSpPr>
+          <p:nvPr>
+            <p:ph idx="1"/>
+          </p:nvPr>
         </p:nvSpPr>
         <p:spPr>
           <a:xfrm>
-            <a:off x="1864626" y="2420960"/>
-            <a:ext cx="9059768" cy="2585323"/>
+            <a:off x="838200" y="1690688"/>
+            <a:ext cx="9706897" cy="4735869"/>
           </a:xfrm>
-          <a:prstGeom prst="rect">
-            <a:avLst/>
-          </a:prstGeom>
         </p:spPr>
         <p:txBody>
-          <a:bodyPr wrap="square">
-            <a:spAutoFit/>
+          <a:bodyPr>
+            <a:normAutofit fontScale="92500" lnSpcReduction="20000"/>
           </a:bodyPr>
           <a:lstStyle/>
           <a:p>
-            <a:pPr lvl="0" fontAlgn="base">
-              <a:spcBef>
-                <a:spcPct val="0"/>
-              </a:spcBef>
-              <a:spcAft>
-                <a:spcPct val="0"/>
-              </a:spcAft>
-              <a:buFontTx/>
-              <a:buChar char="•"/>
+            <a:r>
+              <a:rPr lang="de-CH" dirty="0" smtClean="0"/>
+              <a:t>Project </a:t>
+            </a:r>
+            <a:r>
+              <a:rPr lang="de-CH" dirty="0" err="1" smtClean="0"/>
+              <a:t>Scope</a:t>
+            </a:r>
+            <a:endParaRPr lang="de-CH" dirty="0" smtClean="0"/>
+          </a:p>
+          <a:p>
+            <a:pPr lvl="1"/>
+            <a:r>
+              <a:rPr lang="de-CH" dirty="0" smtClean="0"/>
+              <a:t>Anwendungen spezifisch für Psychiater</a:t>
+            </a:r>
+          </a:p>
+          <a:p>
+            <a:pPr lvl="1"/>
+            <a:r>
+              <a:rPr lang="de-CH" dirty="0" smtClean="0"/>
+              <a:t>Web-</a:t>
+            </a:r>
+            <a:r>
+              <a:rPr lang="de-CH" dirty="0" err="1" smtClean="0"/>
+              <a:t>Based</a:t>
+            </a:r>
+            <a:r>
+              <a:rPr lang="de-CH" dirty="0" smtClean="0"/>
+              <a:t> App (Mobil/Desktop)</a:t>
+            </a:r>
+          </a:p>
+          <a:p>
+            <a:pPr lvl="1"/>
+            <a:r>
+              <a:rPr lang="de-CH" dirty="0" smtClean="0"/>
+              <a:t>Terminerfassung &amp; </a:t>
+            </a:r>
+            <a:r>
+              <a:rPr lang="de-CH" dirty="0" smtClean="0"/>
+              <a:t>Übersicht</a:t>
+            </a:r>
+          </a:p>
+          <a:p>
+            <a:pPr lvl="1"/>
+            <a:r>
+              <a:rPr lang="de-CH" dirty="0" smtClean="0"/>
+              <a:t>Patientenübersicht</a:t>
+            </a:r>
+            <a:endParaRPr lang="de-CH" dirty="0" smtClean="0"/>
+          </a:p>
+          <a:p>
+            <a:pPr lvl="1"/>
+            <a:r>
+              <a:rPr lang="de-CH" dirty="0" smtClean="0"/>
+              <a:t>Behandlungsverlauf</a:t>
+            </a:r>
+          </a:p>
+          <a:p>
+            <a:r>
+              <a:rPr lang="de-CH" dirty="0" smtClean="0"/>
+              <a:t>Out </a:t>
+            </a:r>
+            <a:r>
+              <a:rPr lang="de-CH" dirty="0" err="1" smtClean="0"/>
+              <a:t>of</a:t>
+            </a:r>
+            <a:r>
+              <a:rPr lang="de-CH" dirty="0" smtClean="0"/>
+              <a:t> </a:t>
+            </a:r>
+            <a:r>
+              <a:rPr lang="de-CH" dirty="0" err="1" smtClean="0"/>
+              <a:t>Scope</a:t>
+            </a:r>
+            <a:endParaRPr lang="de-CH" dirty="0" smtClean="0"/>
+          </a:p>
+          <a:p>
+            <a:pPr lvl="1"/>
+            <a:r>
+              <a:rPr lang="de-CH" dirty="0" smtClean="0"/>
+              <a:t>Abrechnung</a:t>
+            </a:r>
+          </a:p>
+          <a:p>
+            <a:pPr lvl="1"/>
+            <a:r>
+              <a:rPr lang="de-CH" dirty="0" smtClean="0"/>
+              <a:t>Krankheitsakte</a:t>
+            </a:r>
+          </a:p>
+          <a:p>
+            <a:pPr lvl="1"/>
+            <a:r>
+              <a:rPr lang="de-CH" dirty="0" smtClean="0"/>
+              <a:t>OP-Plan</a:t>
+            </a:r>
+          </a:p>
+          <a:p>
+            <a:pPr lvl="1"/>
+            <a:r>
+              <a:rPr lang="de-CH" dirty="0" smtClean="0"/>
+              <a:t>Anwendungen für Patienten und </a:t>
+            </a:r>
+            <a:r>
+              <a:rPr lang="de-CH" dirty="0" err="1" smtClean="0"/>
+              <a:t>Gesundheitsbeuftragten</a:t>
+            </a:r>
+            <a:endParaRPr lang="de-CH" dirty="0" smtClean="0"/>
+          </a:p>
+          <a:p>
+            <a:r>
+              <a:rPr lang="de-CH" dirty="0" smtClean="0"/>
+              <a:t>Erfolgsmessung</a:t>
+            </a:r>
+          </a:p>
+          <a:p>
+            <a:pPr lvl="1"/>
+            <a:r>
+              <a:rPr lang="de-CH" dirty="0" smtClean="0"/>
+              <a:t>Validierung durch Test User</a:t>
+            </a:r>
+          </a:p>
+          <a:p>
+            <a:pPr lvl="1"/>
+            <a:r>
+              <a:rPr lang="de-CH" dirty="0" smtClean="0"/>
+              <a:t>Input von Herrn Lehmann (Interview</a:t>
+            </a:r>
+          </a:p>
+          <a:p>
+            <a:pPr marL="0" indent="0">
+              <a:buNone/>
             </a:pPr>
-            <a:r>
-              <a:rPr lang="de-CH" sz="2400" dirty="0" smtClean="0"/>
-              <a:t>Anwendungen </a:t>
-            </a:r>
-            <a:r>
-              <a:rPr lang="de-CH" sz="2400" dirty="0" smtClean="0"/>
-              <a:t>für den Arzt/Behandelnden</a:t>
-            </a:r>
-          </a:p>
-          <a:p>
-            <a:pPr lvl="0" eaLnBrk="0" fontAlgn="base" hangingPunct="0">
-              <a:spcBef>
-                <a:spcPct val="0"/>
-              </a:spcBef>
-              <a:spcAft>
-                <a:spcPct val="0"/>
-              </a:spcAft>
-              <a:buFontTx/>
-              <a:buChar char="•"/>
-            </a:pPr>
-            <a:r>
-              <a:rPr lang="de-CH" sz="2400" dirty="0" err="1" smtClean="0"/>
-              <a:t>App</a:t>
-            </a:r>
-            <a:r>
-              <a:rPr lang="de-CH" sz="2400" dirty="0" smtClean="0"/>
-              <a:t> Web </a:t>
-            </a:r>
-            <a:r>
-              <a:rPr lang="de-CH" sz="2400" dirty="0" err="1" smtClean="0"/>
-              <a:t>Based</a:t>
-            </a:r>
-            <a:r>
-              <a:rPr lang="de-CH" sz="2400" dirty="0" smtClean="0"/>
-              <a:t> (Mobil/Desktop)</a:t>
-            </a:r>
-          </a:p>
-          <a:p>
-            <a:pPr lvl="0" eaLnBrk="0" fontAlgn="base" hangingPunct="0">
-              <a:spcBef>
-                <a:spcPct val="0"/>
-              </a:spcBef>
-              <a:spcAft>
-                <a:spcPct val="0"/>
-              </a:spcAft>
-              <a:buFontTx/>
-              <a:buChar char="•"/>
-            </a:pPr>
-            <a:r>
-              <a:rPr lang="de-CH" sz="2400" dirty="0" smtClean="0"/>
-              <a:t>Termine des Arztes</a:t>
-            </a:r>
-          </a:p>
-          <a:p>
-            <a:pPr lvl="0" eaLnBrk="0" fontAlgn="base" hangingPunct="0">
-              <a:spcBef>
-                <a:spcPct val="0"/>
-              </a:spcBef>
-              <a:spcAft>
-                <a:spcPct val="0"/>
-              </a:spcAft>
-              <a:buFontTx/>
-              <a:buChar char="•"/>
-            </a:pPr>
-            <a:r>
-              <a:rPr lang="de-CH" sz="2400" dirty="0" smtClean="0"/>
-              <a:t>Vereinfachung/Erleichterung/Unterstützung der Behandlung durch unsere Applikation</a:t>
-            </a:r>
-          </a:p>
-          <a:p>
-            <a:pPr lvl="2">
-              <a:buFont typeface="Arial" pitchFamily="34" charset="0"/>
-              <a:buChar char="•"/>
-            </a:pPr>
-            <a:endParaRPr lang="de-CH" sz="2400" dirty="0" smtClean="0"/>
-          </a:p>
-          <a:p>
-            <a:pPr lvl="0">
-              <a:buFont typeface="Arial" pitchFamily="34" charset="0"/>
-              <a:buChar char="•"/>
-            </a:pPr>
-            <a:endParaRPr lang="de-CH" dirty="0" smtClean="0"/>
+            <a:endParaRPr lang="de-CH" dirty="0"/>
           </a:p>
         </p:txBody>
       </p:sp>
     </p:spTree>
     <p:extLst>
       <p:ext uri="{BB962C8B-B14F-4D97-AF65-F5344CB8AC3E}">
-        <p14:creationId xmlns="" xmlns:p14="http://schemas.microsoft.com/office/powerpoint/2010/main" val="4118920468"/>
+        <p14:creationId xmlns:p14="http://schemas.microsoft.com/office/powerpoint/2010/main" val="395184079"/>
       </p:ext>
     </p:extLst>
   </p:cSld>
@@ -4837,7 +5026,7 @@
                   <a:srgbClr val="00B050"/>
                 </a:solidFill>
               </a:rPr>
-              <a:t>2. Research</a:t>
+              <a:t>2. Research: Interviews</a:t>
             </a:r>
             <a:endParaRPr lang="de-CH" dirty="0"/>
           </a:p>
@@ -4855,8 +5044,8 @@
         </p:nvSpPr>
         <p:spPr>
           <a:xfrm>
-            <a:off x="838200" y="1825625"/>
-            <a:ext cx="9706897" cy="3557536"/>
+            <a:off x="838200" y="1825624"/>
+            <a:ext cx="9706897" cy="4331335"/>
           </a:xfrm>
         </p:spPr>
         <p:txBody>
@@ -4865,19 +5054,58 @@
           </a:bodyPr>
           <a:lstStyle/>
           <a:p>
-            <a:pPr>
-              <a:buNone/>
-            </a:pPr>
             <a:r>
               <a:rPr lang="de-CH" dirty="0" smtClean="0"/>
-              <a:t>Feldstudie:</a:t>
-            </a:r>
-          </a:p>
-          <a:p>
-            <a:r>
-              <a:rPr lang="de-CH" dirty="0" err="1" smtClean="0"/>
-              <a:t>Curaprax</a:t>
-            </a:r>
+              <a:t>Interview mit Herrn Lehmann </a:t>
+            </a:r>
+            <a:r>
+              <a:rPr lang="de-CH" dirty="0" smtClean="0">
+                <a:sym typeface="Wingdings" panose="05000000000000000000" pitchFamily="2" charset="2"/>
+              </a:rPr>
+              <a:t> </a:t>
+            </a:r>
+            <a:r>
+              <a:rPr lang="de-CH" dirty="0" smtClean="0"/>
+              <a:t>ehemaliger Arzt in Psychiatrie </a:t>
+            </a:r>
+          </a:p>
+          <a:p>
+            <a:pPr lvl="1"/>
+            <a:r>
+              <a:rPr lang="de-CH" dirty="0" smtClean="0"/>
+              <a:t>Erkenntnisse:</a:t>
+            </a:r>
+          </a:p>
+          <a:p>
+            <a:pPr lvl="2"/>
+            <a:r>
+              <a:rPr lang="de-CH" dirty="0" smtClean="0"/>
+              <a:t>Simpel</a:t>
+            </a:r>
+          </a:p>
+          <a:p>
+            <a:pPr lvl="2"/>
+            <a:r>
+              <a:rPr lang="de-CH" dirty="0" smtClean="0"/>
+              <a:t>Funktionell</a:t>
+            </a:r>
+          </a:p>
+          <a:p>
+            <a:pPr lvl="2"/>
+            <a:r>
+              <a:rPr lang="de-CH" dirty="0" smtClean="0"/>
+              <a:t>Allgemeine Funktionen</a:t>
+            </a:r>
+          </a:p>
+          <a:p>
+            <a:pPr lvl="2"/>
+            <a:r>
+              <a:rPr lang="de-CH" dirty="0" smtClean="0"/>
+              <a:t>Spezialwünsche</a:t>
+            </a:r>
+          </a:p>
+          <a:p>
+            <a:pPr lvl="1"/>
             <a:endParaRPr lang="de-CH" dirty="0"/>
           </a:p>
           <a:p>
@@ -4891,7 +5119,7 @@
     </p:spTree>
     <p:extLst>
       <p:ext uri="{BB962C8B-B14F-4D97-AF65-F5344CB8AC3E}">
-        <p14:creationId xmlns="" xmlns:p14="http://schemas.microsoft.com/office/powerpoint/2010/main" val="4073794779"/>
+        <p14:creationId xmlns:p14="http://schemas.microsoft.com/office/powerpoint/2010/main" val="199477204"/>
       </p:ext>
     </p:extLst>
   </p:cSld>
@@ -4927,7 +5155,147 @@
       </p:grpSpPr>
       <p:sp>
         <p:nvSpPr>
-          <p:cNvPr id="2" name="Titel 1"/>
+          <p:cNvPr id="6" name="Inhaltsplatzhalter 2"/>
+          <p:cNvSpPr>
+            <a:spLocks noGrp="1"/>
+          </p:cNvSpPr>
+          <p:nvPr>
+            <p:ph idx="1"/>
+          </p:nvPr>
+        </p:nvSpPr>
+        <p:spPr>
+          <a:xfrm>
+            <a:off x="838200" y="1825624"/>
+            <a:ext cx="9706897" cy="4595495"/>
+          </a:xfrm>
+        </p:spPr>
+        <p:txBody>
+          <a:bodyPr>
+            <a:normAutofit/>
+          </a:bodyPr>
+          <a:lstStyle/>
+          <a:p>
+            <a:r>
+              <a:rPr lang="de-CH" dirty="0" smtClean="0"/>
+              <a:t>Interview mit Herrn </a:t>
+            </a:r>
+            <a:r>
+              <a:rPr lang="de-CH" dirty="0" smtClean="0"/>
+              <a:t>Dr. </a:t>
+            </a:r>
+            <a:r>
+              <a:rPr lang="de-CH" dirty="0" err="1" smtClean="0"/>
+              <a:t>Grossenbacher</a:t>
+            </a:r>
+            <a:r>
+              <a:rPr lang="de-CH" dirty="0" smtClean="0"/>
+              <a:t> </a:t>
+            </a:r>
+            <a:r>
+              <a:rPr lang="de-CH" dirty="0" smtClean="0">
+                <a:sym typeface="Wingdings" panose="05000000000000000000" pitchFamily="2" charset="2"/>
+              </a:rPr>
+              <a:t> </a:t>
+            </a:r>
+            <a:r>
+              <a:rPr lang="de-CH" dirty="0" smtClean="0"/>
+              <a:t>Arzt im PSY Bern </a:t>
+            </a:r>
+            <a:endParaRPr lang="de-CH" dirty="0" smtClean="0"/>
+          </a:p>
+          <a:p>
+            <a:pPr lvl="1"/>
+            <a:r>
+              <a:rPr lang="de-CH" dirty="0" smtClean="0"/>
+              <a:t>Erkenntnisse:</a:t>
+            </a:r>
+          </a:p>
+          <a:p>
+            <a:pPr lvl="2"/>
+            <a:r>
+              <a:rPr lang="de-CH" dirty="0" smtClean="0"/>
+              <a:t>Gemeinsame Krankengeschichte</a:t>
+            </a:r>
+            <a:endParaRPr lang="de-CH" dirty="0" smtClean="0"/>
+          </a:p>
+          <a:p>
+            <a:pPr lvl="2"/>
+            <a:r>
+              <a:rPr lang="de-CH" dirty="0" smtClean="0"/>
+              <a:t>Vernetzte Agenden</a:t>
+            </a:r>
+            <a:endParaRPr lang="de-CH" dirty="0" smtClean="0"/>
+          </a:p>
+          <a:p>
+            <a:pPr lvl="2"/>
+            <a:r>
+              <a:rPr lang="de-CH" dirty="0" smtClean="0"/>
+              <a:t>SMS Alert System</a:t>
+            </a:r>
+          </a:p>
+          <a:p>
+            <a:pPr lvl="2"/>
+            <a:r>
+              <a:rPr lang="de-CH" dirty="0" smtClean="0"/>
+              <a:t>Administration-Aktivitäten Benachrichtigung im Email Verkehr</a:t>
+            </a:r>
+          </a:p>
+          <a:p>
+            <a:pPr lvl="2"/>
+            <a:r>
+              <a:rPr lang="de-CH" dirty="0" smtClean="0"/>
+              <a:t>Erfassen von Medikamenten </a:t>
+            </a:r>
+            <a:r>
+              <a:rPr lang="de-CH" dirty="0" smtClean="0">
+                <a:sym typeface="Wingdings" panose="05000000000000000000" pitchFamily="2" charset="2"/>
+              </a:rPr>
+              <a:t> anzeigen von Wechselwirkungen</a:t>
+            </a:r>
+          </a:p>
+          <a:p>
+            <a:pPr lvl="3"/>
+            <a:r>
+              <a:rPr lang="de-CH" dirty="0" smtClean="0">
+                <a:sym typeface="Wingdings" panose="05000000000000000000" pitchFamily="2" charset="2"/>
+              </a:rPr>
+              <a:t>Bei Delegierung an Administration</a:t>
+            </a:r>
+          </a:p>
+          <a:p>
+            <a:pPr lvl="3"/>
+            <a:r>
+              <a:rPr lang="de-CH" dirty="0" smtClean="0">
+                <a:sym typeface="Wingdings" panose="05000000000000000000" pitchFamily="2" charset="2"/>
+              </a:rPr>
+              <a:t>Bereits vor dem Erfassen des Medikaments</a:t>
+            </a:r>
+          </a:p>
+          <a:p>
+            <a:pPr lvl="3"/>
+            <a:r>
+              <a:rPr lang="de-CH" dirty="0" smtClean="0">
+                <a:sym typeface="Wingdings" panose="05000000000000000000" pitchFamily="2" charset="2"/>
+              </a:rPr>
+              <a:t>Warnhinweise gut sichtbar anzeigen</a:t>
+            </a:r>
+            <a:endParaRPr lang="de-CH" dirty="0" smtClean="0"/>
+          </a:p>
+          <a:p>
+            <a:pPr lvl="1"/>
+            <a:endParaRPr lang="de-CH" dirty="0"/>
+          </a:p>
+          <a:p>
+            <a:pPr marL="0" indent="0">
+              <a:buNone/>
+            </a:pPr>
+            <a:endParaRPr lang="de-CH" dirty="0"/>
+          </a:p>
+        </p:txBody>
+      </p:sp>
+      <p:sp>
+        <p:nvSpPr>
+          <p:cNvPr id="3" name="Titel 2"/>
           <p:cNvSpPr>
             <a:spLocks noGrp="1"/>
           </p:cNvSpPr>
@@ -4941,96 +5309,21 @@
           <a:lstStyle/>
           <a:p>
             <a:r>
-              <a:rPr lang="de-CH" b="1" dirty="0" smtClean="0">
+              <a:rPr lang="de-CH" b="1" dirty="0">
                 <a:solidFill>
                   <a:srgbClr val="00B050"/>
                 </a:solidFill>
               </a:rPr>
-              <a:t>2. Research</a:t>
+              <a:t>2. Research: Interviews</a:t>
             </a:r>
             <a:endParaRPr lang="de-CH" dirty="0"/>
-          </a:p>
-        </p:txBody>
-      </p:sp>
-      <p:sp>
-        <p:nvSpPr>
-          <p:cNvPr id="4" name="Rechteck 3"/>
-          <p:cNvSpPr/>
-          <p:nvPr/>
-        </p:nvSpPr>
-        <p:spPr>
-          <a:xfrm>
-            <a:off x="1965283" y="1667925"/>
-            <a:ext cx="9059768" cy="1477328"/>
-          </a:xfrm>
-          <a:prstGeom prst="rect">
-            <a:avLst/>
-          </a:prstGeom>
-        </p:spPr>
-        <p:txBody>
-          <a:bodyPr wrap="square">
-            <a:spAutoFit/>
-          </a:bodyPr>
-          <a:lstStyle/>
-          <a:p>
-            <a:pPr lvl="0"/>
-            <a:r>
-              <a:rPr lang="de-CH" sz="2400" dirty="0" smtClean="0"/>
-              <a:t>Interviews:</a:t>
-            </a:r>
-          </a:p>
-          <a:p>
-            <a:pPr lvl="0"/>
-            <a:endParaRPr lang="de-CH" sz="2400" dirty="0" smtClean="0"/>
-          </a:p>
-          <a:p>
-            <a:pPr lvl="0">
-              <a:buFont typeface="Arial" pitchFamily="34" charset="0"/>
-              <a:buChar char="•"/>
-            </a:pPr>
-            <a:r>
-              <a:rPr lang="de-CH" sz="2400" dirty="0" smtClean="0">
-                <a:solidFill>
-                  <a:srgbClr val="FF0000"/>
-                </a:solidFill>
-              </a:rPr>
-              <a:t>Erkenntnisse durch </a:t>
-            </a:r>
-            <a:r>
-              <a:rPr lang="de-CH" sz="2400" dirty="0" err="1" smtClean="0">
-                <a:solidFill>
-                  <a:srgbClr val="FF0000"/>
-                </a:solidFill>
-              </a:rPr>
-              <a:t>Hr.Lehmann</a:t>
-            </a:r>
-            <a:r>
-              <a:rPr lang="de-CH" sz="2400" dirty="0" smtClean="0">
-                <a:solidFill>
-                  <a:srgbClr val="FF0000"/>
-                </a:solidFill>
-              </a:rPr>
-              <a:t> Interview</a:t>
-            </a:r>
-            <a:endParaRPr lang="de-CH" sz="2400" dirty="0" smtClean="0">
-              <a:solidFill>
-                <a:srgbClr val="FF0000"/>
-              </a:solidFill>
-            </a:endParaRPr>
-          </a:p>
-          <a:p>
-            <a:pPr lvl="0">
-              <a:buFont typeface="Arial" pitchFamily="34" charset="0"/>
-              <a:buChar char="•"/>
-            </a:pPr>
-            <a:endParaRPr lang="de-CH" dirty="0" smtClean="0"/>
           </a:p>
         </p:txBody>
       </p:sp>
     </p:spTree>
     <p:extLst>
       <p:ext uri="{BB962C8B-B14F-4D97-AF65-F5344CB8AC3E}">
-        <p14:creationId xmlns="" xmlns:p14="http://schemas.microsoft.com/office/powerpoint/2010/main" val="4073794779"/>
+        <p14:creationId xmlns:p14="http://schemas.microsoft.com/office/powerpoint/2010/main" val="4073794779"/>
       </p:ext>
     </p:extLst>
   </p:cSld>
@@ -5080,12 +5373,12 @@
           <a:lstStyle/>
           <a:p>
             <a:r>
-              <a:rPr lang="de-CH" b="1" dirty="0" smtClean="0">
+              <a:rPr lang="de-CH" b="1" dirty="0">
                 <a:solidFill>
                   <a:srgbClr val="00B050"/>
                 </a:solidFill>
               </a:rPr>
-              <a:t>2. Research</a:t>
+              <a:t>2. Research: Interviews</a:t>
             </a:r>
             <a:endParaRPr lang="de-CH" dirty="0"/>
           </a:p>
@@ -5093,185 +5386,130 @@
       </p:sp>
       <p:sp>
         <p:nvSpPr>
-          <p:cNvPr id="4" name="Rechteck 3"/>
-          <p:cNvSpPr/>
-          <p:nvPr/>
+          <p:cNvPr id="7" name="Inhaltsplatzhalter 2"/>
+          <p:cNvSpPr>
+            <a:spLocks noGrp="1"/>
+          </p:cNvSpPr>
+          <p:nvPr>
+            <p:ph idx="1"/>
+          </p:nvPr>
         </p:nvSpPr>
         <p:spPr>
           <a:xfrm>
-            <a:off x="1965283" y="1667925"/>
-            <a:ext cx="9059768" cy="4431983"/>
+            <a:off x="838200" y="1825624"/>
+            <a:ext cx="9706897" cy="4595495"/>
           </a:xfrm>
-          <a:prstGeom prst="rect">
-            <a:avLst/>
-          </a:prstGeom>
         </p:spPr>
         <p:txBody>
-          <a:bodyPr wrap="square">
-            <a:spAutoFit/>
+          <a:bodyPr>
+            <a:normAutofit/>
           </a:bodyPr>
           <a:lstStyle/>
           <a:p>
-            <a:pPr lvl="0"/>
-            <a:r>
-              <a:rPr lang="de-CH" sz="2400" dirty="0" smtClean="0"/>
-              <a:t>Erkenntnisse aus PSY Bern vom Psychiater </a:t>
-            </a:r>
-            <a:r>
-              <a:rPr lang="de-CH" sz="2400" dirty="0" err="1" smtClean="0"/>
-              <a:t>Dr.Grossenbacher</a:t>
-            </a:r>
-            <a:r>
-              <a:rPr lang="de-CH" sz="2400" dirty="0" smtClean="0"/>
-              <a:t>:</a:t>
-            </a:r>
-          </a:p>
-          <a:p>
-            <a:pPr lvl="0"/>
-            <a:endParaRPr lang="de-CH" sz="2400" dirty="0" smtClean="0"/>
-          </a:p>
-          <a:p>
-            <a:pPr lvl="0"/>
-            <a:r>
-              <a:rPr lang="de-CH" sz="2400" b="1" dirty="0" err="1" smtClean="0"/>
-              <a:t>Must</a:t>
-            </a:r>
-            <a:r>
-              <a:rPr lang="de-CH" sz="2400" b="1" dirty="0" smtClean="0"/>
+            <a:r>
+              <a:rPr lang="de-CH" dirty="0" smtClean="0"/>
+              <a:t>Interview mit Herrn </a:t>
+            </a:r>
+            <a:r>
+              <a:rPr lang="de-CH" dirty="0" smtClean="0"/>
+              <a:t>Dr. </a:t>
+            </a:r>
+            <a:r>
+              <a:rPr lang="de-CH" dirty="0" err="1" smtClean="0"/>
+              <a:t>Grossenbacher</a:t>
+            </a:r>
+            <a:r>
+              <a:rPr lang="de-CH" dirty="0" smtClean="0"/>
               <a:t> </a:t>
             </a:r>
             <a:r>
-              <a:rPr lang="de-CH" sz="2400" b="1" dirty="0" err="1" smtClean="0"/>
-              <a:t>feautures</a:t>
-            </a:r>
-            <a:r>
-              <a:rPr lang="de-CH" sz="2400" b="1" dirty="0" smtClean="0"/>
-              <a:t>:</a:t>
-            </a:r>
-          </a:p>
-          <a:p>
-            <a:pPr lvl="0">
-              <a:buFont typeface="Arial" pitchFamily="34" charset="0"/>
-              <a:buChar char="•"/>
+              <a:rPr lang="de-CH" dirty="0" smtClean="0">
+                <a:sym typeface="Wingdings" panose="05000000000000000000" pitchFamily="2" charset="2"/>
+              </a:rPr>
+              <a:t> </a:t>
+            </a:r>
+            <a:r>
+              <a:rPr lang="de-CH" dirty="0" smtClean="0"/>
+              <a:t>Arzt im PSY Bern </a:t>
+            </a:r>
+            <a:endParaRPr lang="de-CH" dirty="0" smtClean="0"/>
+          </a:p>
+          <a:p>
+            <a:pPr lvl="1"/>
+            <a:r>
+              <a:rPr lang="de-CH" dirty="0" smtClean="0"/>
+              <a:t>Wünschenswerte Verbesserungen:</a:t>
+            </a:r>
+            <a:endParaRPr lang="de-CH" dirty="0" smtClean="0"/>
+          </a:p>
+          <a:p>
+            <a:pPr lvl="2"/>
+            <a:r>
+              <a:rPr lang="de-CH" dirty="0"/>
+              <a:t>Flexiblere Einnahmezeiten gestalten als fix Mo/Mi/Ab bei der </a:t>
+            </a:r>
+            <a:r>
+              <a:rPr lang="de-CH" dirty="0" smtClean="0"/>
+              <a:t>Medikation</a:t>
+            </a:r>
+            <a:endParaRPr lang="de-CH" dirty="0" smtClean="0"/>
+          </a:p>
+          <a:p>
+            <a:pPr lvl="2"/>
+            <a:r>
+              <a:rPr lang="de-CH" dirty="0"/>
+              <a:t>Warnhirnweis sichtbar bei erster Konsultation mit aggressivem </a:t>
+            </a:r>
+            <a:r>
+              <a:rPr lang="de-CH" dirty="0" smtClean="0"/>
+              <a:t>Patient</a:t>
+            </a:r>
+            <a:endParaRPr lang="de-CH" dirty="0" smtClean="0"/>
+          </a:p>
+          <a:p>
+            <a:pPr lvl="2"/>
+            <a:r>
+              <a:rPr lang="de-CH" dirty="0"/>
+              <a:t>nur wenig vordefinierte Felder anlegen  für Freitext </a:t>
+            </a:r>
+            <a:endParaRPr lang="de-CH" dirty="0" smtClean="0"/>
+          </a:p>
+          <a:p>
+            <a:pPr lvl="3"/>
+            <a:r>
+              <a:rPr lang="de-CH" dirty="0"/>
+              <a:t>1xFeld-&gt;Medikation /1xFeld für den </a:t>
+            </a:r>
+            <a:r>
+              <a:rPr lang="de-CH" dirty="0" smtClean="0"/>
+              <a:t>Rest</a:t>
+            </a:r>
+          </a:p>
+          <a:p>
+            <a:pPr lvl="2"/>
+            <a:r>
+              <a:rPr lang="de-CH" dirty="0"/>
+              <a:t>GUI intuitiv und einfach machen</a:t>
+            </a:r>
+          </a:p>
+          <a:p>
+            <a:pPr marL="457200" lvl="1" indent="0">
+              <a:buNone/>
             </a:pPr>
-            <a:r>
-              <a:rPr lang="de-CH" sz="2400" dirty="0" smtClean="0"/>
-              <a:t>gemeinsame Krankengeschichte</a:t>
-            </a:r>
-          </a:p>
-          <a:p>
-            <a:pPr lvl="0">
-              <a:buFont typeface="Arial" pitchFamily="34" charset="0"/>
-              <a:buChar char="•"/>
+            <a:endParaRPr lang="de-CH" dirty="0"/>
+          </a:p>
+          <a:p>
+            <a:pPr marL="0" indent="0">
+              <a:buNone/>
             </a:pPr>
-            <a:r>
-              <a:rPr lang="de-CH" sz="2400" dirty="0" smtClean="0"/>
-              <a:t>vernetzte Agenden</a:t>
-            </a:r>
-          </a:p>
-          <a:p>
-            <a:pPr lvl="0">
-              <a:buFont typeface="Arial" pitchFamily="34" charset="0"/>
-              <a:buChar char="•"/>
-            </a:pPr>
-            <a:r>
-              <a:rPr lang="de-CH" sz="2400" dirty="0" smtClean="0"/>
-              <a:t>SMS-Alert System</a:t>
-            </a:r>
-          </a:p>
-          <a:p>
-            <a:pPr lvl="0">
-              <a:buFont typeface="Arial" pitchFamily="34" charset="0"/>
-              <a:buChar char="•"/>
-            </a:pPr>
-            <a:r>
-              <a:rPr lang="de-CH" sz="2400" dirty="0" smtClean="0"/>
-              <a:t>Administration-Aktivitäten Benachrichtigung im E-Mail Verkehr</a:t>
-            </a:r>
-            <a:endParaRPr lang="de-CH" sz="2400" dirty="0" smtClean="0"/>
-          </a:p>
-          <a:p>
-            <a:pPr lvl="0">
-              <a:buFont typeface="Arial" pitchFamily="34" charset="0"/>
-              <a:buChar char="•"/>
-            </a:pPr>
-            <a:r>
-              <a:rPr lang="de-CH" sz="2400" dirty="0" smtClean="0"/>
-              <a:t>Beim </a:t>
-            </a:r>
-            <a:r>
-              <a:rPr lang="de-CH" sz="2400" dirty="0" smtClean="0"/>
-              <a:t>Erfassung von </a:t>
-            </a:r>
-            <a:r>
-              <a:rPr lang="de-CH" sz="2400" dirty="0" smtClean="0"/>
-              <a:t>Medikamenten </a:t>
-            </a:r>
-            <a:r>
-              <a:rPr lang="de-CH" sz="2400" dirty="0" smtClean="0"/>
-              <a:t>-&gt;Wechselwirkungen anzeigen </a:t>
-            </a:r>
-            <a:r>
-              <a:rPr lang="de-CH" sz="2400" dirty="0" smtClean="0"/>
-              <a:t>bei:</a:t>
-            </a:r>
-          </a:p>
-          <a:p>
-            <a:pPr lvl="1">
-              <a:buFont typeface="Arial" pitchFamily="34" charset="0"/>
-              <a:buChar char="•"/>
-            </a:pPr>
-            <a:r>
-              <a:rPr lang="de-CH" sz="2400" dirty="0" smtClean="0"/>
-              <a:t> Delegierung an Administration</a:t>
-            </a:r>
-          </a:p>
-          <a:p>
-            <a:pPr lvl="1">
-              <a:buFont typeface="Arial" pitchFamily="34" charset="0"/>
-              <a:buChar char="•"/>
-            </a:pPr>
-            <a:r>
-              <a:rPr lang="de-CH" sz="2400" dirty="0" smtClean="0"/>
-              <a:t>Auch bereits vor dem Erfassen des Medikamentes</a:t>
-            </a:r>
-          </a:p>
-          <a:p>
-            <a:pPr lvl="2">
-              <a:buFont typeface="Arial" pitchFamily="34" charset="0"/>
-              <a:buChar char="•"/>
-            </a:pPr>
-            <a:r>
-              <a:rPr lang="de-CH" sz="2400" dirty="0" smtClean="0"/>
-              <a:t>diese</a:t>
-            </a:r>
-            <a:r>
-              <a:rPr lang="de-CH" sz="2400" dirty="0" smtClean="0"/>
-              <a:t> </a:t>
-            </a:r>
-            <a:r>
-              <a:rPr lang="de-CH" sz="2400" dirty="0" smtClean="0"/>
-              <a:t>Warnhinweise </a:t>
-            </a:r>
-            <a:r>
-              <a:rPr lang="de-CH" sz="2400" dirty="0" smtClean="0"/>
-              <a:t>gut sichtbar anzeigen</a:t>
-            </a:r>
-            <a:endParaRPr lang="de-CH" sz="2400" dirty="0" smtClean="0"/>
-          </a:p>
-          <a:p>
-            <a:pPr lvl="0">
-              <a:buFont typeface="Arial" pitchFamily="34" charset="0"/>
-              <a:buChar char="•"/>
-            </a:pPr>
-            <a:endParaRPr lang="de-CH" dirty="0" smtClean="0"/>
+            <a:endParaRPr lang="de-CH" dirty="0"/>
           </a:p>
         </p:txBody>
       </p:sp>
     </p:spTree>
     <p:extLst>
       <p:ext uri="{BB962C8B-B14F-4D97-AF65-F5344CB8AC3E}">
-        <p14:creationId xmlns="" xmlns:p14="http://schemas.microsoft.com/office/powerpoint/2010/main" val="4073794779"/>
+        <p14:creationId xmlns:p14="http://schemas.microsoft.com/office/powerpoint/2010/main" val="4073794779"/>
       </p:ext>
     </p:extLst>
   </p:cSld>
@@ -5332,122 +5570,119 @@
           </a:p>
         </p:txBody>
       </p:sp>
-      <p:sp>
-        <p:nvSpPr>
-          <p:cNvPr id="5" name="Rechteck 4"/>
-          <p:cNvSpPr/>
+      <p:pic>
+        <p:nvPicPr>
+          <p:cNvPr id="5" name="Bildplatzhalter 4" descr="Manuel Pfister - Internet Explorer"/>
+          <p:cNvPicPr>
+            <a:picLocks noChangeAspect="1"/>
+          </p:cNvPicPr>
           <p:nvPr/>
-        </p:nvSpPr>
+        </p:nvPicPr>
+        <p:blipFill>
+          <a:blip r:embed="rId2"/>
+          <a:srcRect/>
+          <a:stretch>
+            <a:fillRect/>
+          </a:stretch>
+        </p:blipFill>
         <p:spPr>
           <a:xfrm>
-            <a:off x="1991410" y="2039919"/>
-            <a:ext cx="7113402" cy="3416320"/>
+            <a:off x="6381366" y="1018955"/>
+            <a:ext cx="4188372" cy="4873625"/>
           </a:xfrm>
           <a:prstGeom prst="rect">
             <a:avLst/>
           </a:prstGeom>
         </p:spPr>
+      </p:pic>
+      <p:sp>
+        <p:nvSpPr>
+          <p:cNvPr id="6" name="Rechteck 5"/>
+          <p:cNvSpPr/>
+          <p:nvPr/>
+        </p:nvSpPr>
+        <p:spPr>
+          <a:xfrm>
+            <a:off x="1966484" y="2539000"/>
+            <a:ext cx="3153105" cy="1754326"/>
+          </a:xfrm>
+          <a:prstGeom prst="rect">
+            <a:avLst/>
+          </a:prstGeom>
+        </p:spPr>
         <p:txBody>
           <a:bodyPr wrap="square">
             <a:spAutoFit/>
           </a:bodyPr>
           <a:lstStyle/>
           <a:p>
-            <a:r>
-              <a:rPr lang="de-CH" sz="2400" b="1" dirty="0" smtClean="0"/>
-              <a:t>Wünschenswerte Verbesserungen:</a:t>
-            </a:r>
-          </a:p>
-          <a:p>
-            <a:endParaRPr lang="de-CH" sz="2400" b="1" dirty="0" smtClean="0"/>
-          </a:p>
-          <a:p>
-            <a:pPr>
-              <a:buFont typeface="Arial" pitchFamily="34" charset="0"/>
-              <a:buChar char="•"/>
-            </a:pPr>
-            <a:r>
-              <a:rPr lang="de-CH" sz="2400" dirty="0" smtClean="0"/>
-              <a:t>F</a:t>
-            </a:r>
-            <a:r>
-              <a:rPr lang="de-CH" sz="2400" dirty="0" smtClean="0"/>
-              <a:t>lexiblere Einnahmezeiten </a:t>
-            </a:r>
-            <a:r>
-              <a:rPr lang="de-CH" sz="2400" dirty="0" smtClean="0"/>
-              <a:t>gestalten als fix Mo/Mi/Ab bei der Medikation</a:t>
-            </a:r>
-          </a:p>
-          <a:p>
-            <a:pPr lvl="0">
-              <a:buFont typeface="Arial" pitchFamily="34" charset="0"/>
-              <a:buChar char="•"/>
-            </a:pPr>
-            <a:r>
-              <a:rPr lang="de-CH" sz="2400" dirty="0" smtClean="0"/>
-              <a:t> Warnhirnweis sichtbar bei erster Konsultation mit aggressivem Patient</a:t>
-            </a:r>
-          </a:p>
-          <a:p>
-            <a:pPr lvl="0">
-              <a:buFont typeface="Arial" pitchFamily="34" charset="0"/>
-              <a:buChar char="•"/>
-            </a:pPr>
-            <a:r>
-              <a:rPr lang="de-CH" sz="2400" dirty="0" smtClean="0"/>
-              <a:t>nur </a:t>
-            </a:r>
-            <a:r>
-              <a:rPr lang="de-CH" sz="2400" dirty="0" smtClean="0"/>
-              <a:t>wenig </a:t>
-            </a:r>
-            <a:r>
-              <a:rPr lang="de-CH" sz="2400" dirty="0" smtClean="0"/>
-              <a:t>vordefinierte Felder anlegen  für </a:t>
-            </a:r>
-            <a:r>
-              <a:rPr lang="de-CH" sz="2400" dirty="0" smtClean="0"/>
-              <a:t>Freitext</a:t>
-            </a:r>
-            <a:r>
-              <a:rPr lang="de-CH" sz="2400" dirty="0" smtClean="0"/>
-              <a:t>: </a:t>
-            </a:r>
-            <a:endParaRPr lang="de-CH" sz="2400" dirty="0" smtClean="0"/>
-          </a:p>
-          <a:p>
-            <a:pPr lvl="1">
-              <a:buFont typeface="Arial" pitchFamily="34" charset="0"/>
-              <a:buChar char="•"/>
-            </a:pPr>
-            <a:r>
-              <a:rPr lang="de-CH" sz="2400" dirty="0" smtClean="0"/>
-              <a:t>1xFeld-&gt;</a:t>
-            </a:r>
-            <a:r>
-              <a:rPr lang="de-CH" sz="2400" dirty="0" smtClean="0"/>
-              <a:t>Medikation /1xFeld für den Rest</a:t>
-            </a:r>
-            <a:endParaRPr lang="de-CH" sz="2400" dirty="0" smtClean="0"/>
-          </a:p>
-          <a:p>
-            <a:pPr lvl="0">
-              <a:buFont typeface="Arial" pitchFamily="34" charset="0"/>
-              <a:buChar char="•"/>
-            </a:pPr>
-            <a:r>
-              <a:rPr lang="de-CH" sz="2400" dirty="0" smtClean="0"/>
-              <a:t>GUI intuitiv und einfach machen</a:t>
-            </a:r>
-            <a:endParaRPr lang="de-CH" sz="2400" dirty="0"/>
+            <a:pPr lvl="0"/>
+            <a:r>
+              <a:rPr lang="de-CH" b="1" dirty="0" smtClean="0"/>
+              <a:t>Was ist seit dem Interview passiert?</a:t>
+            </a:r>
+          </a:p>
+          <a:p>
+            <a:pPr lvl="0"/>
+            <a:endParaRPr lang="de-CH" b="1" dirty="0" smtClean="0">
+              <a:hlinkClick r:id="rId3"/>
+            </a:endParaRPr>
+          </a:p>
+          <a:p>
+            <a:pPr lvl="0"/>
+            <a:endParaRPr lang="de-CH" dirty="0" smtClean="0">
+              <a:hlinkClick r:id="rId3"/>
+            </a:endParaRPr>
+          </a:p>
+          <a:p>
+            <a:pPr lvl="0"/>
+            <a:r>
+              <a:rPr lang="de-CH" dirty="0" smtClean="0">
+                <a:hlinkClick r:id="rId3"/>
+              </a:rPr>
+              <a:t>http://www.synopses.ch/</a:t>
+            </a:r>
+            <a:endParaRPr lang="de-CH" dirty="0" smtClean="0"/>
+          </a:p>
+          <a:p>
+            <a:pPr lvl="0"/>
+            <a:endParaRPr lang="de-CH" dirty="0" smtClean="0"/>
+          </a:p>
+        </p:txBody>
+      </p:sp>
+      <p:sp>
+        <p:nvSpPr>
+          <p:cNvPr id="7" name="Rechteck 6"/>
+          <p:cNvSpPr/>
+          <p:nvPr/>
+        </p:nvSpPr>
+        <p:spPr>
+          <a:xfrm>
+            <a:off x="6353503" y="5743904"/>
+            <a:ext cx="4009697" cy="307777"/>
+          </a:xfrm>
+          <a:prstGeom prst="rect">
+            <a:avLst/>
+          </a:prstGeom>
+        </p:spPr>
+        <p:txBody>
+          <a:bodyPr wrap="square">
+            <a:spAutoFit/>
+          </a:bodyPr>
+          <a:lstStyle/>
+          <a:p>
+            <a:pPr lvl="0"/>
+            <a:r>
+              <a:rPr lang="de-CH" sz="1400" dirty="0" smtClean="0"/>
+              <a:t>Quellenangabe: Bieler Tagblatt, 25.03.15</a:t>
+            </a:r>
           </a:p>
         </p:txBody>
       </p:sp>
     </p:spTree>
     <p:extLst>
       <p:ext uri="{BB962C8B-B14F-4D97-AF65-F5344CB8AC3E}">
-        <p14:creationId xmlns="" xmlns:p14="http://schemas.microsoft.com/office/powerpoint/2010/main" val="4073794779"/>
+        <p14:creationId xmlns:p14="http://schemas.microsoft.com/office/powerpoint/2010/main" val="4073794779"/>
       </p:ext>
     </p:extLst>
   </p:cSld>
@@ -5502,126 +5737,114 @@
                   <a:srgbClr val="00B050"/>
                 </a:solidFill>
               </a:rPr>
-              <a:t>2. Research</a:t>
-            </a:r>
+              <a:t>2. </a:t>
+            </a:r>
+            <a:r>
+              <a:rPr lang="de-CH" b="1" dirty="0" smtClean="0">
+                <a:solidFill>
+                  <a:srgbClr val="00B050"/>
+                </a:solidFill>
+              </a:rPr>
+              <a:t>Research: </a:t>
+            </a:r>
+            <a:r>
+              <a:rPr lang="de-CH" b="1" dirty="0" err="1" smtClean="0">
+                <a:solidFill>
+                  <a:srgbClr val="00B050"/>
+                </a:solidFill>
+              </a:rPr>
+              <a:t>Fieldstudy</a:t>
+            </a:r>
+            <a:endParaRPr lang="de-CH" dirty="0"/>
+          </a:p>
+        </p:txBody>
+      </p:sp>
+      <p:sp>
+        <p:nvSpPr>
+          <p:cNvPr id="6" name="Inhaltsplatzhalter 2"/>
+          <p:cNvSpPr>
+            <a:spLocks noGrp="1"/>
+          </p:cNvSpPr>
+          <p:nvPr>
+            <p:ph idx="1"/>
+          </p:nvPr>
+        </p:nvSpPr>
+        <p:spPr>
+          <a:xfrm>
+            <a:off x="838200" y="1690688"/>
+            <a:ext cx="9706897" cy="1019176"/>
+          </a:xfrm>
+        </p:spPr>
+        <p:txBody>
+          <a:bodyPr>
+            <a:normAutofit/>
+          </a:bodyPr>
+          <a:lstStyle/>
+          <a:p>
+            <a:r>
+              <a:rPr lang="de-CH" dirty="0" smtClean="0"/>
+              <a:t>Feldstudie</a:t>
+            </a:r>
+            <a:endParaRPr lang="de-CH" dirty="0" smtClean="0"/>
+          </a:p>
+          <a:p>
+            <a:pPr lvl="1"/>
+            <a:r>
+              <a:rPr lang="de-CH" dirty="0" err="1" smtClean="0"/>
+              <a:t>Curaprax</a:t>
+            </a:r>
+            <a:r>
+              <a:rPr lang="de-CH" dirty="0" smtClean="0"/>
+              <a:t>: </a:t>
+            </a:r>
+            <a:r>
+              <a:rPr lang="de-DE" dirty="0" smtClean="0"/>
+              <a:t>webbasierte </a:t>
+            </a:r>
+            <a:r>
+              <a:rPr lang="de-DE" dirty="0"/>
+              <a:t>Applikation für die Praxisorganisation</a:t>
+            </a:r>
+            <a:endParaRPr lang="de-CH" dirty="0" smtClean="0"/>
+          </a:p>
+          <a:p>
+            <a:pPr lvl="1"/>
+            <a:endParaRPr lang="de-CH" dirty="0"/>
+          </a:p>
+          <a:p>
+            <a:pPr marL="0" indent="0">
+              <a:buNone/>
+            </a:pPr>
             <a:endParaRPr lang="de-CH" dirty="0"/>
           </a:p>
         </p:txBody>
       </p:sp>
       <p:pic>
         <p:nvPicPr>
-          <p:cNvPr id="5" name="Bildplatzhalter 4" descr="Manuel Pfister - Internet Explorer"/>
-          <p:cNvPicPr>
-            <a:picLocks noChangeAspect="1"/>
-          </p:cNvPicPr>
+          <p:cNvPr id="7" name="Grafik 6"/>
+          <p:cNvPicPr/>
           <p:nvPr/>
         </p:nvPicPr>
         <p:blipFill>
           <a:blip r:embed="rId2"/>
-          <a:srcRect/>
           <a:stretch>
             <a:fillRect/>
           </a:stretch>
         </p:blipFill>
         <p:spPr>
           <a:xfrm>
-            <a:off x="6381366" y="1018955"/>
-            <a:ext cx="4188372" cy="4873625"/>
+            <a:off x="1828800" y="2709864"/>
+            <a:ext cx="7233919" cy="3878262"/>
           </a:xfrm>
           <a:prstGeom prst="rect">
             <a:avLst/>
           </a:prstGeom>
         </p:spPr>
       </p:pic>
-      <p:sp>
-        <p:nvSpPr>
-          <p:cNvPr id="6" name="Rechteck 5"/>
-          <p:cNvSpPr/>
-          <p:nvPr/>
-        </p:nvSpPr>
-        <p:spPr>
-          <a:xfrm>
-            <a:off x="1966484" y="2539000"/>
-            <a:ext cx="3153105" cy="1754326"/>
-          </a:xfrm>
-          <a:prstGeom prst="rect">
-            <a:avLst/>
-          </a:prstGeom>
-        </p:spPr>
-        <p:txBody>
-          <a:bodyPr wrap="square">
-            <a:spAutoFit/>
-          </a:bodyPr>
-          <a:lstStyle/>
-          <a:p>
-            <a:pPr lvl="0"/>
-            <a:r>
-              <a:rPr lang="de-CH" b="1" dirty="0" smtClean="0"/>
-              <a:t>Was ist seit dem Interview passiert?</a:t>
-            </a:r>
-            <a:endParaRPr lang="de-CH" b="1" dirty="0" smtClean="0"/>
-          </a:p>
-          <a:p>
-            <a:pPr lvl="0"/>
-            <a:endParaRPr lang="de-CH" b="1" dirty="0" smtClean="0">
-              <a:hlinkClick r:id="rId3"/>
-            </a:endParaRPr>
-          </a:p>
-          <a:p>
-            <a:pPr lvl="0"/>
-            <a:endParaRPr lang="de-CH" dirty="0" smtClean="0">
-              <a:hlinkClick r:id="rId3"/>
-            </a:endParaRPr>
-          </a:p>
-          <a:p>
-            <a:pPr lvl="0"/>
-            <a:r>
-              <a:rPr lang="de-CH" dirty="0" smtClean="0">
-                <a:hlinkClick r:id="rId3"/>
-              </a:rPr>
-              <a:t>http://www.synopses.ch/</a:t>
-            </a:r>
-            <a:endParaRPr lang="de-CH" dirty="0" smtClean="0"/>
-          </a:p>
-          <a:p>
-            <a:pPr lvl="0"/>
-            <a:endParaRPr lang="de-CH" dirty="0" smtClean="0"/>
-          </a:p>
-        </p:txBody>
-      </p:sp>
-      <p:sp>
-        <p:nvSpPr>
-          <p:cNvPr id="7" name="Rechteck 6"/>
-          <p:cNvSpPr/>
-          <p:nvPr/>
-        </p:nvSpPr>
-        <p:spPr>
-          <a:xfrm>
-            <a:off x="6353503" y="5743904"/>
-            <a:ext cx="4009697" cy="307777"/>
-          </a:xfrm>
-          <a:prstGeom prst="rect">
-            <a:avLst/>
-          </a:prstGeom>
-        </p:spPr>
-        <p:txBody>
-          <a:bodyPr wrap="square">
-            <a:spAutoFit/>
-          </a:bodyPr>
-          <a:lstStyle/>
-          <a:p>
-            <a:pPr lvl="0"/>
-            <a:r>
-              <a:rPr lang="de-CH" sz="1400" dirty="0" smtClean="0"/>
-              <a:t>Quellenangabe: Bieler Tagblatt, 25.03.15</a:t>
-            </a:r>
-          </a:p>
-        </p:txBody>
-      </p:sp>
     </p:spTree>
     <p:extLst>
       <p:ext uri="{BB962C8B-B14F-4D97-AF65-F5344CB8AC3E}">
-        <p14:creationId xmlns="" xmlns:p14="http://schemas.microsoft.com/office/powerpoint/2010/main" val="4073794779"/>
+        <p14:creationId xmlns:p14="http://schemas.microsoft.com/office/powerpoint/2010/main" val="1559440945"/>
       </p:ext>
     </p:extLst>
   </p:cSld>
@@ -5694,6 +5917,14 @@
               </a:rPr>
               <a:t>Synthesize</a:t>
             </a:r>
+            <a:r>
+              <a:rPr lang="de-CH" b="1" dirty="0" smtClean="0">
+                <a:solidFill>
+                  <a:srgbClr val="00B050"/>
+                </a:solidFill>
+              </a:rPr>
+              <a:t>: Target Users</a:t>
+            </a:r>
             <a:endParaRPr lang="de-CH" b="1" dirty="0">
               <a:solidFill>
                 <a:srgbClr val="00B050"/>
@@ -5702,104 +5933,97 @@
           </a:p>
         </p:txBody>
       </p:sp>
+      <p:sp>
+        <p:nvSpPr>
+          <p:cNvPr id="6" name="Inhaltsplatzhalter 2"/>
+          <p:cNvSpPr>
+            <a:spLocks noGrp="1"/>
+          </p:cNvSpPr>
+          <p:nvPr>
+            <p:ph idx="1"/>
+          </p:nvPr>
+        </p:nvSpPr>
+        <p:spPr>
+          <a:xfrm>
+            <a:off x="838200" y="1825624"/>
+            <a:ext cx="9706897" cy="4595495"/>
+          </a:xfrm>
+        </p:spPr>
+        <p:txBody>
+          <a:bodyPr>
+            <a:normAutofit/>
+          </a:bodyPr>
+          <a:lstStyle/>
+          <a:p>
+            <a:pPr lvl="0"/>
+            <a:r>
+              <a:rPr lang="de-CH" dirty="0"/>
+              <a:t>Ärzte</a:t>
+            </a:r>
+            <a:endParaRPr lang="de-CH" sz="3600" dirty="0"/>
+          </a:p>
+          <a:p>
+            <a:pPr lvl="0"/>
+            <a:r>
+              <a:rPr lang="de-CH" dirty="0"/>
+              <a:t>Psychiater</a:t>
+            </a:r>
+            <a:endParaRPr lang="de-CH" sz="3600" dirty="0"/>
+          </a:p>
+          <a:p>
+            <a:pPr lvl="0"/>
+            <a:r>
+              <a:rPr lang="de-CH" dirty="0"/>
+              <a:t>Kleine Praxen, selbstständig</a:t>
+            </a:r>
+            <a:endParaRPr lang="de-CH" sz="3600" dirty="0"/>
+          </a:p>
+          <a:p>
+            <a:pPr lvl="1"/>
+            <a:endParaRPr lang="de-CH" dirty="0"/>
+          </a:p>
+          <a:p>
+            <a:pPr marL="0" indent="0">
+              <a:buNone/>
+            </a:pPr>
+            <a:endParaRPr lang="de-CH" dirty="0"/>
+          </a:p>
+        </p:txBody>
+      </p:sp>
       <p:pic>
         <p:nvPicPr>
-          <p:cNvPr id="3" name="Grafik 2" descr="imagesCAWG4ZTV.jpg"/>
+          <p:cNvPr id="7" name="Grafik 6"/>
           <p:cNvPicPr>
             <a:picLocks noChangeAspect="1"/>
           </p:cNvPicPr>
           <p:nvPr/>
         </p:nvPicPr>
         <p:blipFill>
-          <a:blip r:embed="rId2"/>
+          <a:blip r:embed="rId2">
+            <a:extLst>
+              <a:ext uri="{28A0092B-C50C-407E-A947-70E740481C1C}">
+                <a14:useLocalDpi xmlns:a14="http://schemas.microsoft.com/office/drawing/2010/main" val="0"/>
+              </a:ext>
+            </a:extLst>
+          </a:blip>
           <a:stretch>
             <a:fillRect/>
           </a:stretch>
         </p:blipFill>
         <p:spPr>
           <a:xfrm>
-            <a:off x="7678279" y="3178498"/>
-            <a:ext cx="2148840" cy="1363980"/>
+            <a:off x="3698240" y="3246119"/>
+            <a:ext cx="8128000" cy="3175000"/>
           </a:xfrm>
           <a:prstGeom prst="rect">
             <a:avLst/>
           </a:prstGeom>
         </p:spPr>
       </p:pic>
-      <p:sp>
-        <p:nvSpPr>
-          <p:cNvPr id="4" name="Textfeld 3"/>
-          <p:cNvSpPr txBox="1"/>
-          <p:nvPr/>
-        </p:nvSpPr>
-        <p:spPr>
-          <a:xfrm>
-            <a:off x="2028947" y="2562120"/>
-            <a:ext cx="4593021" cy="2308324"/>
-          </a:xfrm>
-          <a:prstGeom prst="rect">
-            <a:avLst/>
-          </a:prstGeom>
-          <a:noFill/>
-        </p:spPr>
-        <p:txBody>
-          <a:bodyPr wrap="square" rtlCol="0">
-            <a:spAutoFit/>
-          </a:bodyPr>
-          <a:lstStyle/>
-          <a:p>
-            <a:r>
-              <a:rPr lang="de-CH" sz="2400" b="1" dirty="0" smtClean="0"/>
-              <a:t>Zielgruppe: </a:t>
-            </a:r>
-          </a:p>
-          <a:p>
-            <a:pPr>
-              <a:buFont typeface="Arial" pitchFamily="34" charset="0"/>
-              <a:buChar char="•"/>
-            </a:pPr>
-            <a:r>
-              <a:rPr lang="de-CH" sz="2400" dirty="0" smtClean="0"/>
-              <a:t>ambulante Ärzte</a:t>
-            </a:r>
-          </a:p>
-          <a:p>
-            <a:pPr lvl="1">
-              <a:buFont typeface="Arial" pitchFamily="34" charset="0"/>
-              <a:buChar char="•"/>
-            </a:pPr>
-            <a:r>
-              <a:rPr lang="de-CH" sz="2400" dirty="0" smtClean="0"/>
-              <a:t>kleine Praxen</a:t>
-            </a:r>
-          </a:p>
-          <a:p>
-            <a:pPr lvl="1">
-              <a:buFont typeface="Arial" pitchFamily="34" charset="0"/>
-              <a:buChar char="•"/>
-            </a:pPr>
-            <a:r>
-              <a:rPr lang="de-CH" sz="2400" dirty="0" smtClean="0"/>
-              <a:t>Ärzte und Psychiater </a:t>
-            </a:r>
-          </a:p>
-          <a:p>
-            <a:pPr>
-              <a:buFont typeface="Arial" pitchFamily="34" charset="0"/>
-              <a:buChar char="•"/>
-            </a:pPr>
-            <a:r>
-              <a:rPr lang="de-CH" sz="2400" dirty="0" smtClean="0"/>
-              <a:t>Wunsch nach einfacher Bedienung und Intuitivem GUI</a:t>
-            </a:r>
-            <a:endParaRPr lang="de-CH" sz="2400" dirty="0"/>
-          </a:p>
-        </p:txBody>
-      </p:sp>
     </p:spTree>
     <p:extLst>
       <p:ext uri="{BB962C8B-B14F-4D97-AF65-F5344CB8AC3E}">
-        <p14:creationId xmlns="" xmlns:p14="http://schemas.microsoft.com/office/powerpoint/2010/main" val="642442710"/>
+        <p14:creationId xmlns:p14="http://schemas.microsoft.com/office/powerpoint/2010/main" val="642442710"/>
       </p:ext>
     </p:extLst>
   </p:cSld>
@@ -6071,7 +6295,7 @@
   <a:extraClrSchemeLst/>
   <a:extLst>
     <a:ext uri="{05A4C25C-085E-4340-85A3-A5531E510DB2}">
-      <thm15:themeFamily xmlns:thm15="http://schemas.microsoft.com/office/thememl/2012/main" xmlns="" name="Office Theme" id="{62F939B6-93AF-4DB8-9C6B-D6C7DFDC589F}" vid="{4A3C46E8-61CC-4603-A589-7422A47A8E4A}"/>
+      <thm15:themeFamily xmlns:thm15="http://schemas.microsoft.com/office/thememl/2012/main" name="Office Theme" id="{62F939B6-93AF-4DB8-9C6B-D6C7DFDC589F}" vid="{4A3C46E8-61CC-4603-A589-7422A47A8E4A}"/>
     </a:ext>
   </a:extLst>
 </a:theme>

</xml_diff>

<commit_message>
Schriftgrösse angepasst, Bilder eingefügt
</commit_message>
<xml_diff>
--- a/doc/task03/Task3.pptx
+++ b/doc/task03/Task3.pptx
@@ -222,7 +222,7 @@
           <a:p>
             <a:fld id="{5C5501F6-625D-4440-BFE5-621C0F40DF81}" type="datetimeFigureOut">
               <a:rPr lang="de-DE" smtClean="0"/>
-              <a:t>14.10.2015</a:t>
+              <a:t>15.10.2015</a:t>
             </a:fld>
             <a:endParaRPr lang="de-CH"/>
           </a:p>
@@ -892,7 +892,7 @@
             <a:fld id="{B815E98A-0D5B-4172-A8C9-1641F3C9D774}" type="datetimeFigureOut">
               <a:rPr lang="de-CH" smtClean="0"/>
               <a:pPr/>
-              <a:t>14.10.2015</a:t>
+              <a:t>15.10.2015</a:t>
             </a:fld>
             <a:endParaRPr lang="de-CH"/>
           </a:p>
@@ -1064,7 +1064,7 @@
             <a:fld id="{B815E98A-0D5B-4172-A8C9-1641F3C9D774}" type="datetimeFigureOut">
               <a:rPr lang="de-CH" smtClean="0"/>
               <a:pPr/>
-              <a:t>14.10.2015</a:t>
+              <a:t>15.10.2015</a:t>
             </a:fld>
             <a:endParaRPr lang="de-CH"/>
           </a:p>
@@ -1246,7 +1246,7 @@
             <a:fld id="{B815E98A-0D5B-4172-A8C9-1641F3C9D774}" type="datetimeFigureOut">
               <a:rPr lang="de-CH" smtClean="0"/>
               <a:pPr/>
-              <a:t>14.10.2015</a:t>
+              <a:t>15.10.2015</a:t>
             </a:fld>
             <a:endParaRPr lang="de-CH"/>
           </a:p>
@@ -1418,7 +1418,7 @@
             <a:fld id="{B815E98A-0D5B-4172-A8C9-1641F3C9D774}" type="datetimeFigureOut">
               <a:rPr lang="de-CH" smtClean="0"/>
               <a:pPr/>
-              <a:t>14.10.2015</a:t>
+              <a:t>15.10.2015</a:t>
             </a:fld>
             <a:endParaRPr lang="de-CH"/>
           </a:p>
@@ -1666,7 +1666,7 @@
             <a:fld id="{B815E98A-0D5B-4172-A8C9-1641F3C9D774}" type="datetimeFigureOut">
               <a:rPr lang="de-CH" smtClean="0"/>
               <a:pPr/>
-              <a:t>14.10.2015</a:t>
+              <a:t>15.10.2015</a:t>
             </a:fld>
             <a:endParaRPr lang="de-CH"/>
           </a:p>
@@ -1900,7 +1900,7 @@
             <a:fld id="{B815E98A-0D5B-4172-A8C9-1641F3C9D774}" type="datetimeFigureOut">
               <a:rPr lang="de-CH" smtClean="0"/>
               <a:pPr/>
-              <a:t>14.10.2015</a:t>
+              <a:t>15.10.2015</a:t>
             </a:fld>
             <a:endParaRPr lang="de-CH"/>
           </a:p>
@@ -2269,7 +2269,7 @@
             <a:fld id="{B815E98A-0D5B-4172-A8C9-1641F3C9D774}" type="datetimeFigureOut">
               <a:rPr lang="de-CH" smtClean="0"/>
               <a:pPr/>
-              <a:t>14.10.2015</a:t>
+              <a:t>15.10.2015</a:t>
             </a:fld>
             <a:endParaRPr lang="de-CH"/>
           </a:p>
@@ -2389,7 +2389,7 @@
             <a:fld id="{B815E98A-0D5B-4172-A8C9-1641F3C9D774}" type="datetimeFigureOut">
               <a:rPr lang="de-CH" smtClean="0"/>
               <a:pPr/>
-              <a:t>14.10.2015</a:t>
+              <a:t>15.10.2015</a:t>
             </a:fld>
             <a:endParaRPr lang="de-CH"/>
           </a:p>
@@ -2486,7 +2486,7 @@
             <a:fld id="{B815E98A-0D5B-4172-A8C9-1641F3C9D774}" type="datetimeFigureOut">
               <a:rPr lang="de-CH" smtClean="0"/>
               <a:pPr/>
-              <a:t>14.10.2015</a:t>
+              <a:t>15.10.2015</a:t>
             </a:fld>
             <a:endParaRPr lang="de-CH"/>
           </a:p>
@@ -2765,7 +2765,7 @@
             <a:fld id="{B815E98A-0D5B-4172-A8C9-1641F3C9D774}" type="datetimeFigureOut">
               <a:rPr lang="de-CH" smtClean="0"/>
               <a:pPr/>
-              <a:t>14.10.2015</a:t>
+              <a:t>15.10.2015</a:t>
             </a:fld>
             <a:endParaRPr lang="de-CH"/>
           </a:p>
@@ -3020,7 +3020,7 @@
             <a:fld id="{B815E98A-0D5B-4172-A8C9-1641F3C9D774}" type="datetimeFigureOut">
               <a:rPr lang="de-CH" smtClean="0"/>
               <a:pPr/>
-              <a:t>14.10.2015</a:t>
+              <a:t>15.10.2015</a:t>
             </a:fld>
             <a:endParaRPr lang="de-CH"/>
           </a:p>
@@ -3235,7 +3235,7 @@
             <a:fld id="{B815E98A-0D5B-4172-A8C9-1641F3C9D774}" type="datetimeFigureOut">
               <a:rPr lang="de-CH" smtClean="0"/>
               <a:pPr/>
-              <a:t>14.10.2015</a:t>
+              <a:t>15.10.2015</a:t>
             </a:fld>
             <a:endParaRPr lang="de-CH"/>
           </a:p>
@@ -3842,8 +3842,8 @@
         </p:blipFill>
         <p:spPr>
           <a:xfrm>
-            <a:off x="838200" y="1543050"/>
-            <a:ext cx="10932006" cy="4746792"/>
+            <a:off x="428516" y="1365161"/>
+            <a:ext cx="11626890" cy="5048518"/>
           </a:xfrm>
           <a:prstGeom prst="rect">
             <a:avLst/>
@@ -4289,15 +4289,7 @@
                   <a:srgbClr val="00B050"/>
                 </a:solidFill>
               </a:rPr>
-              <a:t>6</a:t>
-            </a:r>
-            <a:r>
-              <a:rPr lang="de-DE" b="1" dirty="0" smtClean="0">
-                <a:solidFill>
-                  <a:srgbClr val="00B050"/>
-                </a:solidFill>
-              </a:rPr>
-              <a:t>. Validation</a:t>
+              <a:t>6. Validation</a:t>
             </a:r>
             <a:endParaRPr lang="en-GB" dirty="0"/>
           </a:p>
@@ -4329,7 +4321,6 @@
               <a:rPr lang="de-CH" dirty="0" smtClean="0"/>
               <a:t>Erneutes Treffen mit Herrn Lehmann</a:t>
             </a:r>
-            <a:endParaRPr lang="de-CH" dirty="0" smtClean="0"/>
           </a:p>
           <a:p>
             <a:pPr lvl="1"/>
@@ -4341,10 +4332,10 @@
           <a:p>
             <a:pPr lvl="2"/>
             <a:r>
-              <a:rPr lang="de-CH" dirty="0" smtClean="0"/>
+              <a:rPr lang="de-CH" sz="2200" dirty="0" smtClean="0"/>
               <a:t>Sprung aus Terminübersicht zu Patient und zurück</a:t>
             </a:r>
-            <a:endParaRPr lang="de-CH" dirty="0" smtClean="0"/>
+            <a:endParaRPr lang="de-CH" sz="2200" dirty="0" smtClean="0"/>
           </a:p>
           <a:p>
             <a:pPr lvl="1"/>
@@ -4369,11 +4360,11 @@
           <a:p>
             <a:pPr lvl="2"/>
             <a:r>
-              <a:rPr lang="de-CH" dirty="0" smtClean="0"/>
+              <a:rPr lang="de-CH" sz="2200" dirty="0" smtClean="0"/>
               <a:t>Chat Funktion </a:t>
             </a:r>
             <a:r>
-              <a:rPr lang="de-CH" dirty="0" smtClean="0">
+              <a:rPr lang="de-CH" sz="2200" dirty="0" smtClean="0">
                 <a:sym typeface="Wingdings" panose="05000000000000000000" pitchFamily="2" charset="2"/>
               </a:rPr>
               <a:t> Abrechnung</a:t>
@@ -4382,12 +4373,12 @@
           <a:p>
             <a:pPr lvl="2"/>
             <a:r>
-              <a:rPr lang="de-CH" dirty="0" smtClean="0">
+              <a:rPr lang="de-CH" sz="2200" dirty="0" smtClean="0">
                 <a:sym typeface="Wingdings" panose="05000000000000000000" pitchFamily="2" charset="2"/>
               </a:rPr>
               <a:t>Medikations-Bestätigung vs. Vertrauen</a:t>
             </a:r>
-            <a:endParaRPr lang="de-CH" dirty="0"/>
+            <a:endParaRPr lang="de-CH" sz="2200" dirty="0"/>
           </a:p>
           <a:p>
             <a:pPr marL="457200" lvl="1" indent="0">
@@ -4403,6 +4394,36 @@
           </a:p>
         </p:txBody>
       </p:sp>
+      <p:pic>
+        <p:nvPicPr>
+          <p:cNvPr id="4" name="Grafik 3"/>
+          <p:cNvPicPr>
+            <a:picLocks noChangeAspect="1"/>
+          </p:cNvPicPr>
+          <p:nvPr/>
+        </p:nvPicPr>
+        <p:blipFill>
+          <a:blip r:embed="rId2">
+            <a:extLst>
+              <a:ext uri="{28A0092B-C50C-407E-A947-70E740481C1C}">
+                <a14:useLocalDpi xmlns:a14="http://schemas.microsoft.com/office/drawing/2010/main" val="0"/>
+              </a:ext>
+            </a:extLst>
+          </a:blip>
+          <a:stretch>
+            <a:fillRect/>
+          </a:stretch>
+        </p:blipFill>
+        <p:spPr>
+          <a:xfrm>
+            <a:off x="7401847" y="3630294"/>
+            <a:ext cx="3143250" cy="2790825"/>
+          </a:xfrm>
+          <a:prstGeom prst="rect">
+            <a:avLst/>
+          </a:prstGeom>
+        </p:spPr>
+      </p:pic>
     </p:spTree>
     <p:extLst>
       <p:ext uri="{BB962C8B-B14F-4D97-AF65-F5344CB8AC3E}">
@@ -4509,7 +4530,6 @@
               <a:rPr lang="de-CH" dirty="0" smtClean="0"/>
               <a:t>Fragen?</a:t>
             </a:r>
-            <a:endParaRPr lang="de-CH" dirty="0" smtClean="0"/>
           </a:p>
           <a:p>
             <a:pPr marL="457200" lvl="1" indent="0">
@@ -4717,7 +4737,6 @@
               <a:rPr lang="de-CH" dirty="0" smtClean="0"/>
               <a:t>Validation</a:t>
             </a:r>
-            <a:endParaRPr lang="de-CH" dirty="0" smtClean="0"/>
           </a:p>
           <a:p>
             <a:pPr marL="514350" indent="-514350">
@@ -4820,13 +4839,13 @@
         </p:nvSpPr>
         <p:spPr>
           <a:xfrm>
-            <a:off x="838200" y="1690688"/>
-            <a:ext cx="9706897" cy="4735869"/>
+            <a:off x="838200" y="1545466"/>
+            <a:ext cx="9799749" cy="5312534"/>
           </a:xfrm>
         </p:spPr>
         <p:txBody>
           <a:bodyPr>
-            <a:normAutofit fontScale="92500" lnSpcReduction="20000"/>
+            <a:normAutofit fontScale="85000" lnSpcReduction="20000"/>
           </a:bodyPr>
           <a:lstStyle/>
           <a:p>
@@ -4843,50 +4862,51 @@
           <a:p>
             <a:pPr lvl="1"/>
             <a:r>
-              <a:rPr lang="de-CH" dirty="0" smtClean="0"/>
+              <a:rPr lang="de-CH" sz="2600" dirty="0" smtClean="0"/>
               <a:t>Anwendungen spezifisch für Psychiater</a:t>
             </a:r>
           </a:p>
           <a:p>
             <a:pPr lvl="1"/>
             <a:r>
-              <a:rPr lang="de-CH" dirty="0" smtClean="0"/>
+              <a:rPr lang="de-CH" sz="2600" dirty="0" smtClean="0"/>
               <a:t>Web-</a:t>
             </a:r>
             <a:r>
-              <a:rPr lang="de-CH" dirty="0" err="1" smtClean="0"/>
+              <a:rPr lang="de-CH" sz="2600" dirty="0" err="1" smtClean="0"/>
               <a:t>Based</a:t>
             </a:r>
             <a:r>
-              <a:rPr lang="de-CH" dirty="0" smtClean="0"/>
+              <a:rPr lang="de-CH" sz="2600" dirty="0" smtClean="0"/>
               <a:t> App (Mobil/Desktop)</a:t>
             </a:r>
           </a:p>
           <a:p>
             <a:pPr lvl="1"/>
             <a:r>
-              <a:rPr lang="de-CH" dirty="0" smtClean="0"/>
-              <a:t>Terminerfassung &amp; </a:t>
-            </a:r>
-            <a:r>
-              <a:rPr lang="de-CH" dirty="0" smtClean="0"/>
-              <a:t>Übersicht</a:t>
+              <a:rPr lang="de-CH" sz="2600" dirty="0" smtClean="0"/>
+              <a:t>Terminerfassung &amp; Übersicht</a:t>
             </a:r>
           </a:p>
           <a:p>
             <a:pPr lvl="1"/>
             <a:r>
-              <a:rPr lang="de-CH" dirty="0" smtClean="0"/>
+              <a:rPr lang="de-CH" sz="2600" dirty="0" smtClean="0"/>
               <a:t>Patientenübersicht</a:t>
             </a:r>
+          </a:p>
+          <a:p>
+            <a:pPr lvl="1"/>
+            <a:r>
+              <a:rPr lang="de-CH" sz="2600" dirty="0" smtClean="0"/>
+              <a:t>Behandlungsverlauf</a:t>
+            </a:r>
+          </a:p>
+          <a:p>
+            <a:pPr marL="457200" lvl="1" indent="0">
+              <a:buNone/>
+            </a:pPr>
             <a:endParaRPr lang="de-CH" dirty="0" smtClean="0"/>
-          </a:p>
-          <a:p>
-            <a:pPr lvl="1"/>
-            <a:r>
-              <a:rPr lang="de-CH" dirty="0" smtClean="0"/>
-              <a:t>Behandlungsverlauf</a:t>
-            </a:r>
           </a:p>
           <a:p>
             <a:r>
@@ -4910,34 +4930,40 @@
           <a:p>
             <a:pPr lvl="1"/>
             <a:r>
-              <a:rPr lang="de-CH" dirty="0" smtClean="0"/>
+              <a:rPr lang="de-CH" sz="2600" dirty="0" smtClean="0"/>
               <a:t>Abrechnung</a:t>
             </a:r>
           </a:p>
           <a:p>
             <a:pPr lvl="1"/>
             <a:r>
-              <a:rPr lang="de-CH" dirty="0" smtClean="0"/>
+              <a:rPr lang="de-CH" sz="2600" dirty="0" smtClean="0"/>
               <a:t>Krankheitsakte</a:t>
             </a:r>
           </a:p>
           <a:p>
             <a:pPr lvl="1"/>
             <a:r>
-              <a:rPr lang="de-CH" dirty="0" smtClean="0"/>
+              <a:rPr lang="de-CH" sz="2600" dirty="0" smtClean="0"/>
               <a:t>OP-Plan</a:t>
             </a:r>
           </a:p>
           <a:p>
             <a:pPr lvl="1"/>
             <a:r>
-              <a:rPr lang="de-CH" dirty="0" smtClean="0"/>
+              <a:rPr lang="de-CH" sz="2600" dirty="0" smtClean="0"/>
               <a:t>Anwendungen für Patienten und </a:t>
             </a:r>
             <a:r>
-              <a:rPr lang="de-CH" dirty="0" err="1" smtClean="0"/>
+              <a:rPr lang="de-CH" sz="2600" dirty="0" err="1" smtClean="0"/>
               <a:t>Gesundheitsbeuftragten</a:t>
             </a:r>
+            <a:endParaRPr lang="de-CH" sz="2600" dirty="0" smtClean="0"/>
+          </a:p>
+          <a:p>
+            <a:pPr marL="457200" lvl="1" indent="0">
+              <a:buNone/>
+            </a:pPr>
             <a:endParaRPr lang="de-CH" dirty="0" smtClean="0"/>
           </a:p>
           <a:p>
@@ -4949,14 +4975,19 @@
           <a:p>
             <a:pPr lvl="1"/>
             <a:r>
-              <a:rPr lang="de-CH" dirty="0" smtClean="0"/>
-              <a:t>Validierung durch Test User</a:t>
-            </a:r>
+              <a:rPr lang="de-CH" sz="2600" dirty="0" smtClean="0"/>
+              <a:t>Validierung durch </a:t>
+            </a:r>
+            <a:r>
+              <a:rPr lang="de-CH" sz="2600" dirty="0" smtClean="0"/>
+              <a:t>Test-User</a:t>
+            </a:r>
+            <a:endParaRPr lang="de-CH" sz="2600" dirty="0" smtClean="0"/>
           </a:p>
           <a:p>
             <a:pPr lvl="1"/>
             <a:r>
-              <a:rPr lang="de-CH" dirty="0" smtClean="0"/>
+              <a:rPr lang="de-CH" sz="2600" dirty="0" smtClean="0"/>
               <a:t>Input von Herrn Lehmann (Interview</a:t>
             </a:r>
           </a:p>
@@ -5079,28 +5110,28 @@
           <a:p>
             <a:pPr lvl="2"/>
             <a:r>
-              <a:rPr lang="de-CH" dirty="0" smtClean="0"/>
+              <a:rPr lang="de-CH" sz="2200" dirty="0" smtClean="0"/>
               <a:t>Simpel</a:t>
             </a:r>
           </a:p>
           <a:p>
             <a:pPr lvl="2"/>
             <a:r>
-              <a:rPr lang="de-CH" dirty="0" smtClean="0"/>
+              <a:rPr lang="de-CH" sz="2200" dirty="0" smtClean="0"/>
               <a:t>Funktionell</a:t>
             </a:r>
           </a:p>
           <a:p>
             <a:pPr lvl="2"/>
             <a:r>
-              <a:rPr lang="de-CH" dirty="0" smtClean="0"/>
+              <a:rPr lang="de-CH" sz="2200" dirty="0" smtClean="0"/>
               <a:t>Allgemeine Funktionen</a:t>
             </a:r>
           </a:p>
           <a:p>
             <a:pPr lvl="2"/>
             <a:r>
-              <a:rPr lang="de-CH" dirty="0" smtClean="0"/>
+              <a:rPr lang="de-CH" sz="2200" dirty="0" smtClean="0"/>
               <a:t>Spezialwünsche</a:t>
             </a:r>
           </a:p>
@@ -5116,6 +5147,36 @@
           </a:p>
         </p:txBody>
       </p:sp>
+      <p:pic>
+        <p:nvPicPr>
+          <p:cNvPr id="4" name="Grafik 3"/>
+          <p:cNvPicPr>
+            <a:picLocks noChangeAspect="1"/>
+          </p:cNvPicPr>
+          <p:nvPr/>
+        </p:nvPicPr>
+        <p:blipFill>
+          <a:blip r:embed="rId2" cstate="print">
+            <a:extLst>
+              <a:ext uri="{28A0092B-C50C-407E-A947-70E740481C1C}">
+                <a14:useLocalDpi xmlns:a14="http://schemas.microsoft.com/office/drawing/2010/main" val="0"/>
+              </a:ext>
+            </a:extLst>
+          </a:blip>
+          <a:stretch>
+            <a:fillRect/>
+          </a:stretch>
+        </p:blipFill>
+        <p:spPr>
+          <a:xfrm>
+            <a:off x="7779268" y="2978304"/>
+            <a:ext cx="2485193" cy="3313591"/>
+          </a:xfrm>
+          <a:prstGeom prst="rect">
+            <a:avLst/>
+          </a:prstGeom>
+        </p:spPr>
+      </p:pic>
     </p:spTree>
     <p:extLst>
       <p:ext uri="{BB962C8B-B14F-4D97-AF65-F5344CB8AC3E}">
@@ -5177,11 +5238,7 @@
           <a:p>
             <a:r>
               <a:rPr lang="de-CH" dirty="0" smtClean="0"/>
-              <a:t>Interview mit Herrn </a:t>
-            </a:r>
-            <a:r>
-              <a:rPr lang="de-CH" dirty="0" smtClean="0"/>
-              <a:t>Dr. </a:t>
+              <a:t>Interview mit Herrn Dr. </a:t>
             </a:r>
             <a:r>
               <a:rPr lang="de-CH" dirty="0" err="1" smtClean="0"/>
@@ -5201,7 +5258,6 @@
               <a:rPr lang="de-CH" dirty="0" smtClean="0"/>
               <a:t>Arzt im PSY Bern </a:t>
             </a:r>
-            <a:endParaRPr lang="de-CH" dirty="0" smtClean="0"/>
           </a:p>
           <a:p>
             <a:pPr lvl="1"/>
@@ -5213,41 +5269,39 @@
           <a:p>
             <a:pPr lvl="2"/>
             <a:r>
-              <a:rPr lang="de-CH" dirty="0" smtClean="0"/>
+              <a:rPr lang="de-CH" sz="2200" dirty="0" smtClean="0"/>
               <a:t>Gemeinsame Krankengeschichte</a:t>
             </a:r>
-            <a:endParaRPr lang="de-CH" dirty="0" smtClean="0"/>
           </a:p>
           <a:p>
             <a:pPr lvl="2"/>
             <a:r>
-              <a:rPr lang="de-CH" dirty="0" smtClean="0"/>
+              <a:rPr lang="de-CH" sz="2200" dirty="0" smtClean="0"/>
               <a:t>Vernetzte Agenden</a:t>
             </a:r>
-            <a:endParaRPr lang="de-CH" dirty="0" smtClean="0"/>
           </a:p>
           <a:p>
             <a:pPr lvl="2"/>
             <a:r>
-              <a:rPr lang="de-CH" dirty="0" smtClean="0"/>
+              <a:rPr lang="de-CH" sz="2200" dirty="0" smtClean="0"/>
               <a:t>SMS Alert System</a:t>
             </a:r>
           </a:p>
           <a:p>
             <a:pPr lvl="2"/>
             <a:r>
-              <a:rPr lang="de-CH" dirty="0" smtClean="0"/>
+              <a:rPr lang="de-CH" sz="2200" dirty="0" smtClean="0"/>
               <a:t>Administration-Aktivitäten Benachrichtigung im Email Verkehr</a:t>
             </a:r>
           </a:p>
           <a:p>
             <a:pPr lvl="2"/>
             <a:r>
-              <a:rPr lang="de-CH" dirty="0" smtClean="0"/>
+              <a:rPr lang="de-CH" sz="2200" dirty="0" smtClean="0"/>
               <a:t>Erfassen von Medikamenten </a:t>
             </a:r>
             <a:r>
-              <a:rPr lang="de-CH" dirty="0" smtClean="0">
+              <a:rPr lang="de-CH" sz="2200" dirty="0" smtClean="0">
                 <a:sym typeface="Wingdings" panose="05000000000000000000" pitchFamily="2" charset="2"/>
               </a:rPr>
               <a:t> anzeigen von Wechselwirkungen</a:t>
@@ -5256,7 +5310,7 @@
           <a:p>
             <a:pPr lvl="3"/>
             <a:r>
-              <a:rPr lang="de-CH" dirty="0" smtClean="0">
+              <a:rPr lang="de-CH" sz="2200" dirty="0" smtClean="0">
                 <a:sym typeface="Wingdings" panose="05000000000000000000" pitchFamily="2" charset="2"/>
               </a:rPr>
               <a:t>Bei Delegierung an Administration</a:t>
@@ -5265,7 +5319,7 @@
           <a:p>
             <a:pPr lvl="3"/>
             <a:r>
-              <a:rPr lang="de-CH" dirty="0" smtClean="0">
+              <a:rPr lang="de-CH" sz="2200" dirty="0" smtClean="0">
                 <a:sym typeface="Wingdings" panose="05000000000000000000" pitchFamily="2" charset="2"/>
               </a:rPr>
               <a:t>Bereits vor dem Erfassen des Medikaments</a:t>
@@ -5274,12 +5328,12 @@
           <a:p>
             <a:pPr lvl="3"/>
             <a:r>
-              <a:rPr lang="de-CH" dirty="0" smtClean="0">
+              <a:rPr lang="de-CH" sz="2200" dirty="0" smtClean="0">
                 <a:sym typeface="Wingdings" panose="05000000000000000000" pitchFamily="2" charset="2"/>
               </a:rPr>
               <a:t>Warnhinweise gut sichtbar anzeigen</a:t>
             </a:r>
-            <a:endParaRPr lang="de-CH" dirty="0" smtClean="0"/>
+            <a:endParaRPr lang="de-CH" sz="2200" dirty="0" smtClean="0"/>
           </a:p>
           <a:p>
             <a:pPr lvl="1"/>
@@ -5408,11 +5462,7 @@
           <a:p>
             <a:r>
               <a:rPr lang="de-CH" dirty="0" smtClean="0"/>
-              <a:t>Interview mit Herrn </a:t>
-            </a:r>
-            <a:r>
-              <a:rPr lang="de-CH" dirty="0" smtClean="0"/>
-              <a:t>Dr. </a:t>
+              <a:t>Interview mit Herrn Dr. </a:t>
             </a:r>
             <a:r>
               <a:rPr lang="de-CH" dirty="0" err="1" smtClean="0"/>
@@ -5432,7 +5482,6 @@
               <a:rPr lang="de-CH" dirty="0" smtClean="0"/>
               <a:t>Arzt im PSY Bern </a:t>
             </a:r>
-            <a:endParaRPr lang="de-CH" dirty="0" smtClean="0"/>
           </a:p>
           <a:p>
             <a:pPr lvl="1"/>
@@ -5440,55 +5489,52 @@
               <a:rPr lang="de-CH" dirty="0" smtClean="0"/>
               <a:t>Wünschenswerte Verbesserungen:</a:t>
             </a:r>
-            <a:endParaRPr lang="de-CH" dirty="0" smtClean="0"/>
           </a:p>
           <a:p>
             <a:pPr lvl="2"/>
             <a:r>
-              <a:rPr lang="de-CH" dirty="0"/>
+              <a:rPr lang="de-CH" sz="2200" dirty="0"/>
               <a:t>Flexiblere Einnahmezeiten gestalten als fix Mo/Mi/Ab bei der </a:t>
             </a:r>
             <a:r>
-              <a:rPr lang="de-CH" dirty="0" smtClean="0"/>
+              <a:rPr lang="de-CH" sz="2200" dirty="0" smtClean="0"/>
               <a:t>Medikation</a:t>
             </a:r>
-            <a:endParaRPr lang="de-CH" dirty="0" smtClean="0"/>
           </a:p>
           <a:p>
             <a:pPr lvl="2"/>
             <a:r>
-              <a:rPr lang="de-CH" dirty="0"/>
+              <a:rPr lang="de-CH" sz="2200" dirty="0"/>
               <a:t>Warnhirnweis sichtbar bei erster Konsultation mit aggressivem </a:t>
             </a:r>
             <a:r>
-              <a:rPr lang="de-CH" dirty="0" smtClean="0"/>
+              <a:rPr lang="de-CH" sz="2200" dirty="0" smtClean="0"/>
               <a:t>Patient</a:t>
             </a:r>
-            <a:endParaRPr lang="de-CH" dirty="0" smtClean="0"/>
           </a:p>
           <a:p>
             <a:pPr lvl="2"/>
             <a:r>
-              <a:rPr lang="de-CH" dirty="0"/>
+              <a:rPr lang="de-CH" sz="2200" dirty="0"/>
               <a:t>nur wenig vordefinierte Felder anlegen  für Freitext </a:t>
             </a:r>
-            <a:endParaRPr lang="de-CH" dirty="0" smtClean="0"/>
+            <a:endParaRPr lang="de-CH" sz="2200" dirty="0" smtClean="0"/>
           </a:p>
           <a:p>
             <a:pPr lvl="3"/>
             <a:r>
-              <a:rPr lang="de-CH" dirty="0"/>
+              <a:rPr lang="de-CH" sz="2200" dirty="0"/>
               <a:t>1xFeld-&gt;Medikation /1xFeld für den </a:t>
             </a:r>
             <a:r>
-              <a:rPr lang="de-CH" dirty="0" smtClean="0"/>
+              <a:rPr lang="de-CH" sz="2200" dirty="0" smtClean="0"/>
               <a:t>Rest</a:t>
             </a:r>
           </a:p>
           <a:p>
             <a:pPr lvl="2"/>
             <a:r>
-              <a:rPr lang="de-CH" dirty="0"/>
+              <a:rPr lang="de-CH" sz="2200" dirty="0"/>
               <a:t>GUI intuitiv und einfach machen</a:t>
             </a:r>
           </a:p>
@@ -5604,7 +5650,7 @@
         <p:spPr>
           <a:xfrm>
             <a:off x="1966484" y="2539000"/>
-            <a:ext cx="3153105" cy="1754326"/>
+            <a:ext cx="3153105" cy="2677656"/>
           </a:xfrm>
           <a:prstGeom prst="rect">
             <a:avLst/>
@@ -5618,35 +5664,35 @@
           <a:p>
             <a:pPr lvl="0"/>
             <a:r>
-              <a:rPr lang="de-CH" b="1" dirty="0" smtClean="0"/>
+              <a:rPr lang="de-CH" sz="2400" b="1" dirty="0" smtClean="0"/>
               <a:t>Was ist seit dem Interview passiert?</a:t>
             </a:r>
           </a:p>
           <a:p>
             <a:pPr lvl="0"/>
-            <a:endParaRPr lang="de-CH" b="1" dirty="0" smtClean="0">
+            <a:endParaRPr lang="de-CH" sz="2400" b="1" dirty="0" smtClean="0">
               <a:hlinkClick r:id="rId3"/>
             </a:endParaRPr>
           </a:p>
           <a:p>
             <a:pPr lvl="0"/>
-            <a:endParaRPr lang="de-CH" dirty="0" smtClean="0">
+            <a:endParaRPr lang="de-CH" sz="2400" dirty="0" smtClean="0">
               <a:hlinkClick r:id="rId3"/>
             </a:endParaRPr>
           </a:p>
           <a:p>
             <a:pPr lvl="0"/>
             <a:r>
-              <a:rPr lang="de-CH" dirty="0" smtClean="0">
+              <a:rPr lang="de-CH" sz="2400" dirty="0" smtClean="0">
                 <a:hlinkClick r:id="rId3"/>
               </a:rPr>
               <a:t>http://www.synopses.ch/</a:t>
             </a:r>
-            <a:endParaRPr lang="de-CH" dirty="0" smtClean="0"/>
+            <a:endParaRPr lang="de-CH" sz="2400" dirty="0" smtClean="0"/>
           </a:p>
           <a:p>
             <a:pPr lvl="0"/>
-            <a:endParaRPr lang="de-CH" dirty="0" smtClean="0"/>
+            <a:endParaRPr lang="de-CH" sz="2400" dirty="0" smtClean="0"/>
           </a:p>
         </p:txBody>
       </p:sp>
@@ -5737,15 +5783,7 @@
                   <a:srgbClr val="00B050"/>
                 </a:solidFill>
               </a:rPr>
-              <a:t>2. </a:t>
-            </a:r>
-            <a:r>
-              <a:rPr lang="de-CH" b="1" dirty="0" smtClean="0">
-                <a:solidFill>
-                  <a:srgbClr val="00B050"/>
-                </a:solidFill>
-              </a:rPr>
-              <a:t>Research: </a:t>
+              <a:t>2. Research: </a:t>
             </a:r>
             <a:r>
               <a:rPr lang="de-CH" b="1" dirty="0" err="1" smtClean="0">
@@ -5785,7 +5823,6 @@
               <a:rPr lang="de-CH" dirty="0" smtClean="0"/>
               <a:t>Feldstudie</a:t>
             </a:r>
-            <a:endParaRPr lang="de-CH" dirty="0" smtClean="0"/>
           </a:p>
           <a:p>
             <a:pPr lvl="1"/>
@@ -5833,8 +5870,8 @@
         </p:blipFill>
         <p:spPr>
           <a:xfrm>
-            <a:off x="1828800" y="2709864"/>
-            <a:ext cx="7233919" cy="3878262"/>
+            <a:off x="1687132" y="2614411"/>
+            <a:ext cx="7469747" cy="4121240"/>
           </a:xfrm>
           <a:prstGeom prst="rect">
             <a:avLst/>
@@ -6012,8 +6049,8 @@
         </p:blipFill>
         <p:spPr>
           <a:xfrm>
-            <a:off x="3698240" y="3246119"/>
-            <a:ext cx="8128000" cy="3175000"/>
+            <a:off x="5138671" y="4267933"/>
+            <a:ext cx="5512157" cy="2153186"/>
           </a:xfrm>
           <a:prstGeom prst="rect">
             <a:avLst/>

</xml_diff>